<commit_message>
Deploying to gh-pages from @ jiaye-wu/jiaye-wu.github.io@ba141b7b60522b26d307d453a170d78833ec5149 🚀
</commit_message>
<xml_diff>
--- a/assets/img/banners/banner_EPFL.pptx
+++ b/assets/img/banners/banner_EPFL.pptx
@@ -2,18 +2,19 @@
 <file path=ppt/presentation.xml><?xml version="1.0" encoding="utf-8"?>
 <p:presentation xmlns:a="http://schemas.openxmlformats.org/drawingml/2006/main" xmlns:r="http://schemas.openxmlformats.org/officeDocument/2006/relationships" xmlns:p="http://schemas.openxmlformats.org/presentationml/2006/main" saveSubsetFonts="1" autoCompressPictures="0">
   <p:sldMasterIdLst>
-    <p:sldMasterId id="2147483648" r:id="rId1"/>
+    <p:sldMasterId id="2147483672" r:id="rId1"/>
   </p:sldMasterIdLst>
   <p:sldIdLst>
     <p:sldId id="256" r:id="rId2"/>
+    <p:sldId id="257" r:id="rId3"/>
   </p:sldIdLst>
-  <p:sldSz cx="12192000" cy="6858000"/>
+  <p:sldSz cx="10691813" cy="914400"/>
   <p:notesSz cx="6858000" cy="9144000"/>
   <p:defaultTextStyle>
     <a:defPPr>
-      <a:defRPr lang="LID4096"/>
+      <a:defRPr lang="en-US"/>
     </a:defPPr>
-    <a:lvl1pPr marL="0" algn="l" defTabSz="914400" rtl="0" eaLnBrk="1" latinLnBrk="0" hangingPunct="1">
+    <a:lvl1pPr marL="0" algn="l" defTabSz="457200" rtl="0" eaLnBrk="1" latinLnBrk="0" hangingPunct="1">
       <a:defRPr sz="1800" kern="1200">
         <a:solidFill>
           <a:schemeClr val="tx1"/>
@@ -23,7 +24,7 @@
         <a:cs typeface="+mn-cs"/>
       </a:defRPr>
     </a:lvl1pPr>
-    <a:lvl2pPr marL="457200" algn="l" defTabSz="914400" rtl="0" eaLnBrk="1" latinLnBrk="0" hangingPunct="1">
+    <a:lvl2pPr marL="457200" algn="l" defTabSz="457200" rtl="0" eaLnBrk="1" latinLnBrk="0" hangingPunct="1">
       <a:defRPr sz="1800" kern="1200">
         <a:solidFill>
           <a:schemeClr val="tx1"/>
@@ -33,7 +34,7 @@
         <a:cs typeface="+mn-cs"/>
       </a:defRPr>
     </a:lvl2pPr>
-    <a:lvl3pPr marL="914400" algn="l" defTabSz="914400" rtl="0" eaLnBrk="1" latinLnBrk="0" hangingPunct="1">
+    <a:lvl3pPr marL="914400" algn="l" defTabSz="457200" rtl="0" eaLnBrk="1" latinLnBrk="0" hangingPunct="1">
       <a:defRPr sz="1800" kern="1200">
         <a:solidFill>
           <a:schemeClr val="tx1"/>
@@ -43,7 +44,7 @@
         <a:cs typeface="+mn-cs"/>
       </a:defRPr>
     </a:lvl3pPr>
-    <a:lvl4pPr marL="1371600" algn="l" defTabSz="914400" rtl="0" eaLnBrk="1" latinLnBrk="0" hangingPunct="1">
+    <a:lvl4pPr marL="1371600" algn="l" defTabSz="457200" rtl="0" eaLnBrk="1" latinLnBrk="0" hangingPunct="1">
       <a:defRPr sz="1800" kern="1200">
         <a:solidFill>
           <a:schemeClr val="tx1"/>
@@ -53,7 +54,7 @@
         <a:cs typeface="+mn-cs"/>
       </a:defRPr>
     </a:lvl4pPr>
-    <a:lvl5pPr marL="1828800" algn="l" defTabSz="914400" rtl="0" eaLnBrk="1" latinLnBrk="0" hangingPunct="1">
+    <a:lvl5pPr marL="1828800" algn="l" defTabSz="457200" rtl="0" eaLnBrk="1" latinLnBrk="0" hangingPunct="1">
       <a:defRPr sz="1800" kern="1200">
         <a:solidFill>
           <a:schemeClr val="tx1"/>
@@ -63,7 +64,7 @@
         <a:cs typeface="+mn-cs"/>
       </a:defRPr>
     </a:lvl5pPr>
-    <a:lvl6pPr marL="2286000" algn="l" defTabSz="914400" rtl="0" eaLnBrk="1" latinLnBrk="0" hangingPunct="1">
+    <a:lvl6pPr marL="2286000" algn="l" defTabSz="457200" rtl="0" eaLnBrk="1" latinLnBrk="0" hangingPunct="1">
       <a:defRPr sz="1800" kern="1200">
         <a:solidFill>
           <a:schemeClr val="tx1"/>
@@ -73,7 +74,7 @@
         <a:cs typeface="+mn-cs"/>
       </a:defRPr>
     </a:lvl6pPr>
-    <a:lvl7pPr marL="2743200" algn="l" defTabSz="914400" rtl="0" eaLnBrk="1" latinLnBrk="0" hangingPunct="1">
+    <a:lvl7pPr marL="2743200" algn="l" defTabSz="457200" rtl="0" eaLnBrk="1" latinLnBrk="0" hangingPunct="1">
       <a:defRPr sz="1800" kern="1200">
         <a:solidFill>
           <a:schemeClr val="tx1"/>
@@ -83,7 +84,7 @@
         <a:cs typeface="+mn-cs"/>
       </a:defRPr>
     </a:lvl7pPr>
-    <a:lvl8pPr marL="3200400" algn="l" defTabSz="914400" rtl="0" eaLnBrk="1" latinLnBrk="0" hangingPunct="1">
+    <a:lvl8pPr marL="3200400" algn="l" defTabSz="457200" rtl="0" eaLnBrk="1" latinLnBrk="0" hangingPunct="1">
       <a:defRPr sz="1800" kern="1200">
         <a:solidFill>
           <a:schemeClr val="tx1"/>
@@ -93,7 +94,7 @@
         <a:cs typeface="+mn-cs"/>
       </a:defRPr>
     </a:lvl8pPr>
-    <a:lvl9pPr marL="3657600" algn="l" defTabSz="914400" rtl="0" eaLnBrk="1" latinLnBrk="0" hangingPunct="1">
+    <a:lvl9pPr marL="3657600" algn="l" defTabSz="457200" rtl="0" eaLnBrk="1" latinLnBrk="0" hangingPunct="1">
       <a:defRPr sz="1800" kern="1200">
         <a:solidFill>
           <a:schemeClr val="tx1"/>
@@ -114,7 +115,7 @@
 
 <file path=ppt/slideLayouts/slideLayout1.xml><?xml version="1.0" encoding="utf-8"?>
 <p:sldLayout xmlns:a="http://schemas.openxmlformats.org/drawingml/2006/main" xmlns:r="http://schemas.openxmlformats.org/officeDocument/2006/relationships" xmlns:p="http://schemas.openxmlformats.org/presentationml/2006/main" type="title" preserve="1">
-  <p:cSld name="Title Slide">
+  <p:cSld name="标题幻灯片">
     <p:spTree>
       <p:nvGrpSpPr>
         <p:cNvPr id="1" name=""/>
@@ -131,13 +132,7 @@
       </p:grpSpPr>
       <p:sp>
         <p:nvSpPr>
-          <p:cNvPr id="2" name="Title 1">
-            <a:extLst>
-              <a:ext uri="{FF2B5EF4-FFF2-40B4-BE49-F238E27FC236}">
-                <a16:creationId xmlns:a16="http://schemas.microsoft.com/office/drawing/2014/main" id="{E6218E03-E11A-CB60-0292-90FFEF5213D9}"/>
-              </a:ext>
-            </a:extLst>
-          </p:cNvPr>
+          <p:cNvPr id="2" name="Title 1"/>
           <p:cNvSpPr>
             <a:spLocks noGrp="1"/>
           </p:cNvSpPr>
@@ -147,35 +142,29 @@
         </p:nvSpPr>
         <p:spPr>
           <a:xfrm>
-            <a:off x="1524000" y="1122363"/>
-            <a:ext cx="9144000" cy="2387600"/>
+            <a:off x="1336477" y="149648"/>
+            <a:ext cx="8018860" cy="318347"/>
           </a:xfrm>
         </p:spPr>
         <p:txBody>
           <a:bodyPr anchor="b"/>
           <a:lstStyle>
             <a:lvl1pPr algn="ctr">
-              <a:defRPr sz="6000"/>
+              <a:defRPr sz="800"/>
             </a:lvl1pPr>
           </a:lstStyle>
           <a:p>
             <a:r>
-              <a:rPr lang="en-US"/>
-              <a:t>Click to edit Master title style</a:t>
-            </a:r>
-            <a:endParaRPr lang="LID4096"/>
-          </a:p>
-        </p:txBody>
-      </p:sp>
-      <p:sp>
-        <p:nvSpPr>
-          <p:cNvPr id="3" name="Subtitle 2">
-            <a:extLst>
-              <a:ext uri="{FF2B5EF4-FFF2-40B4-BE49-F238E27FC236}">
-                <a16:creationId xmlns:a16="http://schemas.microsoft.com/office/drawing/2014/main" id="{9F1031CD-8F89-9FA8-F678-3368B9939605}"/>
-              </a:ext>
-            </a:extLst>
-          </p:cNvPr>
+              <a:rPr lang="zh-CN" altLang="en-US"/>
+              <a:t>单击此处编辑母版标题样式</a:t>
+            </a:r>
+            <a:endParaRPr lang="en-US" dirty="0"/>
+          </a:p>
+        </p:txBody>
+      </p:sp>
+      <p:sp>
+        <p:nvSpPr>
+          <p:cNvPr id="3" name="Subtitle 2"/>
           <p:cNvSpPr>
             <a:spLocks noGrp="1"/>
           </p:cNvSpPr>
@@ -185,8 +174,8 @@
         </p:nvSpPr>
         <p:spPr>
           <a:xfrm>
-            <a:off x="1524000" y="3602038"/>
-            <a:ext cx="9144000" cy="1655762"/>
+            <a:off x="1336477" y="480272"/>
+            <a:ext cx="8018860" cy="220768"/>
           </a:xfrm>
         </p:spPr>
         <p:txBody>
@@ -194,59 +183,53 @@
           <a:lstStyle>
             <a:lvl1pPr marL="0" indent="0" algn="ctr">
               <a:buNone/>
-              <a:defRPr sz="2400"/>
+              <a:defRPr sz="320"/>
             </a:lvl1pPr>
-            <a:lvl2pPr marL="457200" indent="0" algn="ctr">
-              <a:buNone/>
-              <a:defRPr sz="2000"/>
+            <a:lvl2pPr marL="60945" indent="0" algn="ctr">
+              <a:buNone/>
+              <a:defRPr sz="267"/>
             </a:lvl2pPr>
-            <a:lvl3pPr marL="914400" indent="0" algn="ctr">
-              <a:buNone/>
-              <a:defRPr sz="1800"/>
+            <a:lvl3pPr marL="121890" indent="0" algn="ctr">
+              <a:buNone/>
+              <a:defRPr sz="240"/>
             </a:lvl3pPr>
-            <a:lvl4pPr marL="1371600" indent="0" algn="ctr">
-              <a:buNone/>
-              <a:defRPr sz="1600"/>
+            <a:lvl4pPr marL="182834" indent="0" algn="ctr">
+              <a:buNone/>
+              <a:defRPr sz="213"/>
             </a:lvl4pPr>
-            <a:lvl5pPr marL="1828800" indent="0" algn="ctr">
-              <a:buNone/>
-              <a:defRPr sz="1600"/>
+            <a:lvl5pPr marL="243779" indent="0" algn="ctr">
+              <a:buNone/>
+              <a:defRPr sz="213"/>
             </a:lvl5pPr>
-            <a:lvl6pPr marL="2286000" indent="0" algn="ctr">
-              <a:buNone/>
-              <a:defRPr sz="1600"/>
+            <a:lvl6pPr marL="304724" indent="0" algn="ctr">
+              <a:buNone/>
+              <a:defRPr sz="213"/>
             </a:lvl6pPr>
-            <a:lvl7pPr marL="2743200" indent="0" algn="ctr">
-              <a:buNone/>
-              <a:defRPr sz="1600"/>
+            <a:lvl7pPr marL="365669" indent="0" algn="ctr">
+              <a:buNone/>
+              <a:defRPr sz="213"/>
             </a:lvl7pPr>
-            <a:lvl8pPr marL="3200400" indent="0" algn="ctr">
-              <a:buNone/>
-              <a:defRPr sz="1600"/>
+            <a:lvl8pPr marL="426613" indent="0" algn="ctr">
+              <a:buNone/>
+              <a:defRPr sz="213"/>
             </a:lvl8pPr>
-            <a:lvl9pPr marL="3657600" indent="0" algn="ctr">
-              <a:buNone/>
-              <a:defRPr sz="1600"/>
+            <a:lvl9pPr marL="487558" indent="0" algn="ctr">
+              <a:buNone/>
+              <a:defRPr sz="213"/>
             </a:lvl9pPr>
           </a:lstStyle>
           <a:p>
             <a:r>
-              <a:rPr lang="en-US"/>
-              <a:t>Click to edit Master subtitle style</a:t>
-            </a:r>
-            <a:endParaRPr lang="LID4096"/>
-          </a:p>
-        </p:txBody>
-      </p:sp>
-      <p:sp>
-        <p:nvSpPr>
-          <p:cNvPr id="4" name="Date Placeholder 3">
-            <a:extLst>
-              <a:ext uri="{FF2B5EF4-FFF2-40B4-BE49-F238E27FC236}">
-                <a16:creationId xmlns:a16="http://schemas.microsoft.com/office/drawing/2014/main" id="{337BC6B1-7346-3FD2-5212-175A7BB8DF12}"/>
-              </a:ext>
-            </a:extLst>
-          </p:cNvPr>
+              <a:rPr lang="zh-CN" altLang="en-US"/>
+              <a:t>单击此处编辑母版副标题样式</a:t>
+            </a:r>
+            <a:endParaRPr lang="en-US" dirty="0"/>
+          </a:p>
+        </p:txBody>
+      </p:sp>
+      <p:sp>
+        <p:nvSpPr>
+          <p:cNvPr id="4" name="Date Placeholder 3"/>
           <p:cNvSpPr>
             <a:spLocks noGrp="1"/>
           </p:cNvSpPr>
@@ -261,7 +244,7 @@
           <a:p>
             <a:fld id="{F06130A7-DCD0-4467-8EE9-D424F9B7AB0B}" type="datetimeFigureOut">
               <a:rPr lang="LID4096" smtClean="0"/>
-              <a:t>09/09/2024</a:t>
+              <a:t>07/27/2025</a:t>
             </a:fld>
             <a:endParaRPr lang="LID4096"/>
           </a:p>
@@ -269,13 +252,7 @@
       </p:sp>
       <p:sp>
         <p:nvSpPr>
-          <p:cNvPr id="5" name="Footer Placeholder 4">
-            <a:extLst>
-              <a:ext uri="{FF2B5EF4-FFF2-40B4-BE49-F238E27FC236}">
-                <a16:creationId xmlns:a16="http://schemas.microsoft.com/office/drawing/2014/main" id="{1709DE0B-06E4-421F-F2AF-985C029AEF08}"/>
-              </a:ext>
-            </a:extLst>
-          </p:cNvPr>
+          <p:cNvPr id="5" name="Footer Placeholder 4"/>
           <p:cNvSpPr>
             <a:spLocks noGrp="1"/>
           </p:cNvSpPr>
@@ -294,13 +271,7 @@
       </p:sp>
       <p:sp>
         <p:nvSpPr>
-          <p:cNvPr id="6" name="Slide Number Placeholder 5">
-            <a:extLst>
-              <a:ext uri="{FF2B5EF4-FFF2-40B4-BE49-F238E27FC236}">
-                <a16:creationId xmlns:a16="http://schemas.microsoft.com/office/drawing/2014/main" id="{CE0F29E9-D924-0D6D-E7D6-F1CAC856978D}"/>
-              </a:ext>
-            </a:extLst>
-          </p:cNvPr>
+          <p:cNvPr id="6" name="Slide Number Placeholder 5"/>
           <p:cNvSpPr>
             <a:spLocks noGrp="1"/>
           </p:cNvSpPr>
@@ -324,7 +295,7 @@
     </p:spTree>
     <p:extLst>
       <p:ext uri="{BB962C8B-B14F-4D97-AF65-F5344CB8AC3E}">
-        <p14:creationId xmlns:p14="http://schemas.microsoft.com/office/powerpoint/2010/main" val="1309133742"/>
+        <p14:creationId xmlns:p14="http://schemas.microsoft.com/office/powerpoint/2010/main" val="1599448983"/>
       </p:ext>
     </p:extLst>
   </p:cSld>
@@ -336,7 +307,7 @@
 
 <file path=ppt/slideLayouts/slideLayout10.xml><?xml version="1.0" encoding="utf-8"?>
 <p:sldLayout xmlns:a="http://schemas.openxmlformats.org/drawingml/2006/main" xmlns:r="http://schemas.openxmlformats.org/officeDocument/2006/relationships" xmlns:p="http://schemas.openxmlformats.org/presentationml/2006/main" type="vertTx" preserve="1">
-  <p:cSld name="Title and Vertical Text">
+  <p:cSld name="标题和竖排文字">
     <p:spTree>
       <p:nvGrpSpPr>
         <p:cNvPr id="1" name=""/>
@@ -353,13 +324,7 @@
       </p:grpSpPr>
       <p:sp>
         <p:nvSpPr>
-          <p:cNvPr id="2" name="Title 1">
-            <a:extLst>
-              <a:ext uri="{FF2B5EF4-FFF2-40B4-BE49-F238E27FC236}">
-                <a16:creationId xmlns:a16="http://schemas.microsoft.com/office/drawing/2014/main" id="{D26A9063-54C5-6E50-9449-D56B8A732441}"/>
-              </a:ext>
-            </a:extLst>
-          </p:cNvPr>
+          <p:cNvPr id="2" name="Title 1"/>
           <p:cNvSpPr>
             <a:spLocks noGrp="1"/>
           </p:cNvSpPr>
@@ -373,22 +338,16 @@
           <a:lstStyle/>
           <a:p>
             <a:r>
-              <a:rPr lang="en-US"/>
-              <a:t>Click to edit Master title style</a:t>
-            </a:r>
-            <a:endParaRPr lang="LID4096"/>
-          </a:p>
-        </p:txBody>
-      </p:sp>
-      <p:sp>
-        <p:nvSpPr>
-          <p:cNvPr id="3" name="Vertical Text Placeholder 2">
-            <a:extLst>
-              <a:ext uri="{FF2B5EF4-FFF2-40B4-BE49-F238E27FC236}">
-                <a16:creationId xmlns:a16="http://schemas.microsoft.com/office/drawing/2014/main" id="{B84A7328-648A-3B5A-0854-80BF9856D83F}"/>
-              </a:ext>
-            </a:extLst>
-          </p:cNvPr>
+              <a:rPr lang="zh-CN" altLang="en-US"/>
+              <a:t>单击此处编辑母版标题样式</a:t>
+            </a:r>
+            <a:endParaRPr lang="en-US" dirty="0"/>
+          </a:p>
+        </p:txBody>
+      </p:sp>
+      <p:sp>
+        <p:nvSpPr>
+          <p:cNvPr id="3" name="Vertical Text Placeholder 2"/>
           <p:cNvSpPr>
             <a:spLocks noGrp="1"/>
           </p:cNvSpPr>
@@ -403,50 +362,44 @@
           <a:p>
             <a:pPr lvl="0"/>
             <a:r>
-              <a:rPr lang="en-US"/>
-              <a:t>Click to edit Master text styles</a:t>
+              <a:rPr lang="zh-CN" altLang="en-US"/>
+              <a:t>单击此处编辑母版文本样式</a:t>
             </a:r>
           </a:p>
           <a:p>
             <a:pPr lvl="1"/>
             <a:r>
-              <a:rPr lang="en-US"/>
-              <a:t>Second level</a:t>
+              <a:rPr lang="zh-CN" altLang="en-US"/>
+              <a:t>二级</a:t>
             </a:r>
           </a:p>
           <a:p>
             <a:pPr lvl="2"/>
             <a:r>
-              <a:rPr lang="en-US"/>
-              <a:t>Third level</a:t>
+              <a:rPr lang="zh-CN" altLang="en-US"/>
+              <a:t>三级</a:t>
             </a:r>
           </a:p>
           <a:p>
             <a:pPr lvl="3"/>
             <a:r>
-              <a:rPr lang="en-US"/>
-              <a:t>Fourth level</a:t>
+              <a:rPr lang="zh-CN" altLang="en-US"/>
+              <a:t>四级</a:t>
             </a:r>
           </a:p>
           <a:p>
             <a:pPr lvl="4"/>
             <a:r>
-              <a:rPr lang="en-US"/>
-              <a:t>Fifth level</a:t>
-            </a:r>
-            <a:endParaRPr lang="LID4096"/>
-          </a:p>
-        </p:txBody>
-      </p:sp>
-      <p:sp>
-        <p:nvSpPr>
-          <p:cNvPr id="4" name="Date Placeholder 3">
-            <a:extLst>
-              <a:ext uri="{FF2B5EF4-FFF2-40B4-BE49-F238E27FC236}">
-                <a16:creationId xmlns:a16="http://schemas.microsoft.com/office/drawing/2014/main" id="{2D7AB3A4-F71B-EAF5-2662-AADA549AA6ED}"/>
-              </a:ext>
-            </a:extLst>
-          </p:cNvPr>
+              <a:rPr lang="zh-CN" altLang="en-US"/>
+              <a:t>五级</a:t>
+            </a:r>
+            <a:endParaRPr lang="en-US" dirty="0"/>
+          </a:p>
+        </p:txBody>
+      </p:sp>
+      <p:sp>
+        <p:nvSpPr>
+          <p:cNvPr id="4" name="Date Placeholder 3"/>
           <p:cNvSpPr>
             <a:spLocks noGrp="1"/>
           </p:cNvSpPr>
@@ -461,7 +414,7 @@
           <a:p>
             <a:fld id="{F06130A7-DCD0-4467-8EE9-D424F9B7AB0B}" type="datetimeFigureOut">
               <a:rPr lang="LID4096" smtClean="0"/>
-              <a:t>09/09/2024</a:t>
+              <a:t>07/27/2025</a:t>
             </a:fld>
             <a:endParaRPr lang="LID4096"/>
           </a:p>
@@ -469,13 +422,7 @@
       </p:sp>
       <p:sp>
         <p:nvSpPr>
-          <p:cNvPr id="5" name="Footer Placeholder 4">
-            <a:extLst>
-              <a:ext uri="{FF2B5EF4-FFF2-40B4-BE49-F238E27FC236}">
-                <a16:creationId xmlns:a16="http://schemas.microsoft.com/office/drawing/2014/main" id="{9B4BD43C-C81E-43E0-9C6B-77BF3D45F59E}"/>
-              </a:ext>
-            </a:extLst>
-          </p:cNvPr>
+          <p:cNvPr id="5" name="Footer Placeholder 4"/>
           <p:cNvSpPr>
             <a:spLocks noGrp="1"/>
           </p:cNvSpPr>
@@ -494,13 +441,7 @@
       </p:sp>
       <p:sp>
         <p:nvSpPr>
-          <p:cNvPr id="6" name="Slide Number Placeholder 5">
-            <a:extLst>
-              <a:ext uri="{FF2B5EF4-FFF2-40B4-BE49-F238E27FC236}">
-                <a16:creationId xmlns:a16="http://schemas.microsoft.com/office/drawing/2014/main" id="{3F7F1AEB-AFA2-EE01-CFBF-361274A2ED3C}"/>
-              </a:ext>
-            </a:extLst>
-          </p:cNvPr>
+          <p:cNvPr id="6" name="Slide Number Placeholder 5"/>
           <p:cNvSpPr>
             <a:spLocks noGrp="1"/>
           </p:cNvSpPr>
@@ -524,7 +465,7 @@
     </p:spTree>
     <p:extLst>
       <p:ext uri="{BB962C8B-B14F-4D97-AF65-F5344CB8AC3E}">
-        <p14:creationId xmlns:p14="http://schemas.microsoft.com/office/powerpoint/2010/main" val="3150578045"/>
+        <p14:creationId xmlns:p14="http://schemas.microsoft.com/office/powerpoint/2010/main" val="3234477765"/>
       </p:ext>
     </p:extLst>
   </p:cSld>
@@ -536,7 +477,7 @@
 
 <file path=ppt/slideLayouts/slideLayout11.xml><?xml version="1.0" encoding="utf-8"?>
 <p:sldLayout xmlns:a="http://schemas.openxmlformats.org/drawingml/2006/main" xmlns:r="http://schemas.openxmlformats.org/officeDocument/2006/relationships" xmlns:p="http://schemas.openxmlformats.org/presentationml/2006/main" type="vertTitleAndTx" preserve="1">
-  <p:cSld name="Vertical Title and Text">
+  <p:cSld name="竖排标题与文本">
     <p:spTree>
       <p:nvGrpSpPr>
         <p:cNvPr id="1" name=""/>
@@ -553,13 +494,7 @@
       </p:grpSpPr>
       <p:sp>
         <p:nvSpPr>
-          <p:cNvPr id="2" name="Vertical Title 1">
-            <a:extLst>
-              <a:ext uri="{FF2B5EF4-FFF2-40B4-BE49-F238E27FC236}">
-                <a16:creationId xmlns:a16="http://schemas.microsoft.com/office/drawing/2014/main" id="{CFBC6127-DFE4-4379-C013-20EA76364347}"/>
-              </a:ext>
-            </a:extLst>
-          </p:cNvPr>
+          <p:cNvPr id="2" name="Vertical Title 1"/>
           <p:cNvSpPr>
             <a:spLocks noGrp="1"/>
           </p:cNvSpPr>
@@ -569,8 +504,8 @@
         </p:nvSpPr>
         <p:spPr>
           <a:xfrm>
-            <a:off x="8724900" y="365125"/>
-            <a:ext cx="2628900" cy="5811838"/>
+            <a:off x="7651329" y="48683"/>
+            <a:ext cx="2305422" cy="774912"/>
           </a:xfrm>
         </p:spPr>
         <p:txBody>
@@ -578,22 +513,16 @@
           <a:lstStyle/>
           <a:p>
             <a:r>
-              <a:rPr lang="en-US"/>
-              <a:t>Click to edit Master title style</a:t>
-            </a:r>
-            <a:endParaRPr lang="LID4096"/>
-          </a:p>
-        </p:txBody>
-      </p:sp>
-      <p:sp>
-        <p:nvSpPr>
-          <p:cNvPr id="3" name="Vertical Text Placeholder 2">
-            <a:extLst>
-              <a:ext uri="{FF2B5EF4-FFF2-40B4-BE49-F238E27FC236}">
-                <a16:creationId xmlns:a16="http://schemas.microsoft.com/office/drawing/2014/main" id="{EF4E87A9-2CB3-8802-7008-22CA0618CC10}"/>
-              </a:ext>
-            </a:extLst>
-          </p:cNvPr>
+              <a:rPr lang="zh-CN" altLang="en-US"/>
+              <a:t>单击此处编辑母版标题样式</a:t>
+            </a:r>
+            <a:endParaRPr lang="en-US" dirty="0"/>
+          </a:p>
+        </p:txBody>
+      </p:sp>
+      <p:sp>
+        <p:nvSpPr>
+          <p:cNvPr id="3" name="Vertical Text Placeholder 2"/>
           <p:cNvSpPr>
             <a:spLocks noGrp="1"/>
           </p:cNvSpPr>
@@ -603,8 +532,8 @@
         </p:nvSpPr>
         <p:spPr>
           <a:xfrm>
-            <a:off x="838200" y="365125"/>
-            <a:ext cx="7734300" cy="5811838"/>
+            <a:off x="735062" y="48683"/>
+            <a:ext cx="6782619" cy="774912"/>
           </a:xfrm>
         </p:spPr>
         <p:txBody>
@@ -613,50 +542,44 @@
           <a:p>
             <a:pPr lvl="0"/>
             <a:r>
-              <a:rPr lang="en-US"/>
-              <a:t>Click to edit Master text styles</a:t>
+              <a:rPr lang="zh-CN" altLang="en-US"/>
+              <a:t>单击此处编辑母版文本样式</a:t>
             </a:r>
           </a:p>
           <a:p>
             <a:pPr lvl="1"/>
             <a:r>
-              <a:rPr lang="en-US"/>
-              <a:t>Second level</a:t>
+              <a:rPr lang="zh-CN" altLang="en-US"/>
+              <a:t>二级</a:t>
             </a:r>
           </a:p>
           <a:p>
             <a:pPr lvl="2"/>
             <a:r>
-              <a:rPr lang="en-US"/>
-              <a:t>Third level</a:t>
+              <a:rPr lang="zh-CN" altLang="en-US"/>
+              <a:t>三级</a:t>
             </a:r>
           </a:p>
           <a:p>
             <a:pPr lvl="3"/>
             <a:r>
-              <a:rPr lang="en-US"/>
-              <a:t>Fourth level</a:t>
+              <a:rPr lang="zh-CN" altLang="en-US"/>
+              <a:t>四级</a:t>
             </a:r>
           </a:p>
           <a:p>
             <a:pPr lvl="4"/>
             <a:r>
-              <a:rPr lang="en-US"/>
-              <a:t>Fifth level</a:t>
-            </a:r>
-            <a:endParaRPr lang="LID4096"/>
-          </a:p>
-        </p:txBody>
-      </p:sp>
-      <p:sp>
-        <p:nvSpPr>
-          <p:cNvPr id="4" name="Date Placeholder 3">
-            <a:extLst>
-              <a:ext uri="{FF2B5EF4-FFF2-40B4-BE49-F238E27FC236}">
-                <a16:creationId xmlns:a16="http://schemas.microsoft.com/office/drawing/2014/main" id="{0EE7F5A2-EB53-BC18-E902-7379DF064AB4}"/>
-              </a:ext>
-            </a:extLst>
-          </p:cNvPr>
+              <a:rPr lang="zh-CN" altLang="en-US"/>
+              <a:t>五级</a:t>
+            </a:r>
+            <a:endParaRPr lang="en-US" dirty="0"/>
+          </a:p>
+        </p:txBody>
+      </p:sp>
+      <p:sp>
+        <p:nvSpPr>
+          <p:cNvPr id="4" name="Date Placeholder 3"/>
           <p:cNvSpPr>
             <a:spLocks noGrp="1"/>
           </p:cNvSpPr>
@@ -671,7 +594,7 @@
           <a:p>
             <a:fld id="{F06130A7-DCD0-4467-8EE9-D424F9B7AB0B}" type="datetimeFigureOut">
               <a:rPr lang="LID4096" smtClean="0"/>
-              <a:t>09/09/2024</a:t>
+              <a:t>07/27/2025</a:t>
             </a:fld>
             <a:endParaRPr lang="LID4096"/>
           </a:p>
@@ -679,13 +602,7 @@
       </p:sp>
       <p:sp>
         <p:nvSpPr>
-          <p:cNvPr id="5" name="Footer Placeholder 4">
-            <a:extLst>
-              <a:ext uri="{FF2B5EF4-FFF2-40B4-BE49-F238E27FC236}">
-                <a16:creationId xmlns:a16="http://schemas.microsoft.com/office/drawing/2014/main" id="{4CBAE544-9423-4F61-BB8A-496929CEEABA}"/>
-              </a:ext>
-            </a:extLst>
-          </p:cNvPr>
+          <p:cNvPr id="5" name="Footer Placeholder 4"/>
           <p:cNvSpPr>
             <a:spLocks noGrp="1"/>
           </p:cNvSpPr>
@@ -704,13 +621,7 @@
       </p:sp>
       <p:sp>
         <p:nvSpPr>
-          <p:cNvPr id="6" name="Slide Number Placeholder 5">
-            <a:extLst>
-              <a:ext uri="{FF2B5EF4-FFF2-40B4-BE49-F238E27FC236}">
-                <a16:creationId xmlns:a16="http://schemas.microsoft.com/office/drawing/2014/main" id="{84819EBA-1D63-7D5E-2AF9-7961684498D1}"/>
-              </a:ext>
-            </a:extLst>
-          </p:cNvPr>
+          <p:cNvPr id="6" name="Slide Number Placeholder 5"/>
           <p:cNvSpPr>
             <a:spLocks noGrp="1"/>
           </p:cNvSpPr>
@@ -734,7 +645,7 @@
     </p:spTree>
     <p:extLst>
       <p:ext uri="{BB962C8B-B14F-4D97-AF65-F5344CB8AC3E}">
-        <p14:creationId xmlns:p14="http://schemas.microsoft.com/office/powerpoint/2010/main" val="1216401103"/>
+        <p14:creationId xmlns:p14="http://schemas.microsoft.com/office/powerpoint/2010/main" val="1065090752"/>
       </p:ext>
     </p:extLst>
   </p:cSld>
@@ -746,7 +657,7 @@
 
 <file path=ppt/slideLayouts/slideLayout2.xml><?xml version="1.0" encoding="utf-8"?>
 <p:sldLayout xmlns:a="http://schemas.openxmlformats.org/drawingml/2006/main" xmlns:r="http://schemas.openxmlformats.org/officeDocument/2006/relationships" xmlns:p="http://schemas.openxmlformats.org/presentationml/2006/main" type="obj" preserve="1">
-  <p:cSld name="Title and Content">
+  <p:cSld name="标题和内容">
     <p:spTree>
       <p:nvGrpSpPr>
         <p:cNvPr id="1" name=""/>
@@ -763,13 +674,7 @@
       </p:grpSpPr>
       <p:sp>
         <p:nvSpPr>
-          <p:cNvPr id="2" name="Title 1">
-            <a:extLst>
-              <a:ext uri="{FF2B5EF4-FFF2-40B4-BE49-F238E27FC236}">
-                <a16:creationId xmlns:a16="http://schemas.microsoft.com/office/drawing/2014/main" id="{F63C6A04-86E0-3096-B047-B6BB97F082D9}"/>
-              </a:ext>
-            </a:extLst>
-          </p:cNvPr>
+          <p:cNvPr id="2" name="Title 1"/>
           <p:cNvSpPr>
             <a:spLocks noGrp="1"/>
           </p:cNvSpPr>
@@ -783,22 +688,16 @@
           <a:lstStyle/>
           <a:p>
             <a:r>
-              <a:rPr lang="en-US"/>
-              <a:t>Click to edit Master title style</a:t>
-            </a:r>
-            <a:endParaRPr lang="LID4096"/>
-          </a:p>
-        </p:txBody>
-      </p:sp>
-      <p:sp>
-        <p:nvSpPr>
-          <p:cNvPr id="3" name="Content Placeholder 2">
-            <a:extLst>
-              <a:ext uri="{FF2B5EF4-FFF2-40B4-BE49-F238E27FC236}">
-                <a16:creationId xmlns:a16="http://schemas.microsoft.com/office/drawing/2014/main" id="{7F13CAF9-3611-E2CB-BF39-9EF8A6D9E714}"/>
-              </a:ext>
-            </a:extLst>
-          </p:cNvPr>
+              <a:rPr lang="zh-CN" altLang="en-US"/>
+              <a:t>单击此处编辑母版标题样式</a:t>
+            </a:r>
+            <a:endParaRPr lang="en-US" dirty="0"/>
+          </a:p>
+        </p:txBody>
+      </p:sp>
+      <p:sp>
+        <p:nvSpPr>
+          <p:cNvPr id="3" name="Content Placeholder 2"/>
           <p:cNvSpPr>
             <a:spLocks noGrp="1"/>
           </p:cNvSpPr>
@@ -813,50 +712,44 @@
           <a:p>
             <a:pPr lvl="0"/>
             <a:r>
-              <a:rPr lang="en-US"/>
-              <a:t>Click to edit Master text styles</a:t>
+              <a:rPr lang="zh-CN" altLang="en-US"/>
+              <a:t>单击此处编辑母版文本样式</a:t>
             </a:r>
           </a:p>
           <a:p>
             <a:pPr lvl="1"/>
             <a:r>
-              <a:rPr lang="en-US"/>
-              <a:t>Second level</a:t>
+              <a:rPr lang="zh-CN" altLang="en-US"/>
+              <a:t>二级</a:t>
             </a:r>
           </a:p>
           <a:p>
             <a:pPr lvl="2"/>
             <a:r>
-              <a:rPr lang="en-US"/>
-              <a:t>Third level</a:t>
+              <a:rPr lang="zh-CN" altLang="en-US"/>
+              <a:t>三级</a:t>
             </a:r>
           </a:p>
           <a:p>
             <a:pPr lvl="3"/>
             <a:r>
-              <a:rPr lang="en-US"/>
-              <a:t>Fourth level</a:t>
+              <a:rPr lang="zh-CN" altLang="en-US"/>
+              <a:t>四级</a:t>
             </a:r>
           </a:p>
           <a:p>
             <a:pPr lvl="4"/>
             <a:r>
-              <a:rPr lang="en-US"/>
-              <a:t>Fifth level</a:t>
-            </a:r>
-            <a:endParaRPr lang="LID4096"/>
-          </a:p>
-        </p:txBody>
-      </p:sp>
-      <p:sp>
-        <p:nvSpPr>
-          <p:cNvPr id="4" name="Date Placeholder 3">
-            <a:extLst>
-              <a:ext uri="{FF2B5EF4-FFF2-40B4-BE49-F238E27FC236}">
-                <a16:creationId xmlns:a16="http://schemas.microsoft.com/office/drawing/2014/main" id="{1C5E081D-76E6-D78A-47F6-B9115D90A852}"/>
-              </a:ext>
-            </a:extLst>
-          </p:cNvPr>
+              <a:rPr lang="zh-CN" altLang="en-US"/>
+              <a:t>五级</a:t>
+            </a:r>
+            <a:endParaRPr lang="en-US" dirty="0"/>
+          </a:p>
+        </p:txBody>
+      </p:sp>
+      <p:sp>
+        <p:nvSpPr>
+          <p:cNvPr id="4" name="Date Placeholder 3"/>
           <p:cNvSpPr>
             <a:spLocks noGrp="1"/>
           </p:cNvSpPr>
@@ -871,7 +764,7 @@
           <a:p>
             <a:fld id="{F06130A7-DCD0-4467-8EE9-D424F9B7AB0B}" type="datetimeFigureOut">
               <a:rPr lang="LID4096" smtClean="0"/>
-              <a:t>09/09/2024</a:t>
+              <a:t>07/27/2025</a:t>
             </a:fld>
             <a:endParaRPr lang="LID4096"/>
           </a:p>
@@ -879,13 +772,7 @@
       </p:sp>
       <p:sp>
         <p:nvSpPr>
-          <p:cNvPr id="5" name="Footer Placeholder 4">
-            <a:extLst>
-              <a:ext uri="{FF2B5EF4-FFF2-40B4-BE49-F238E27FC236}">
-                <a16:creationId xmlns:a16="http://schemas.microsoft.com/office/drawing/2014/main" id="{92C9E9DC-7BB9-BF1A-CF5B-9FC2F7F36866}"/>
-              </a:ext>
-            </a:extLst>
-          </p:cNvPr>
+          <p:cNvPr id="5" name="Footer Placeholder 4"/>
           <p:cNvSpPr>
             <a:spLocks noGrp="1"/>
           </p:cNvSpPr>
@@ -904,13 +791,7 @@
       </p:sp>
       <p:sp>
         <p:nvSpPr>
-          <p:cNvPr id="6" name="Slide Number Placeholder 5">
-            <a:extLst>
-              <a:ext uri="{FF2B5EF4-FFF2-40B4-BE49-F238E27FC236}">
-                <a16:creationId xmlns:a16="http://schemas.microsoft.com/office/drawing/2014/main" id="{CE39BABB-009B-6964-D475-54D793EDBDAB}"/>
-              </a:ext>
-            </a:extLst>
-          </p:cNvPr>
+          <p:cNvPr id="6" name="Slide Number Placeholder 5"/>
           <p:cNvSpPr>
             <a:spLocks noGrp="1"/>
           </p:cNvSpPr>
@@ -934,7 +815,7 @@
     </p:spTree>
     <p:extLst>
       <p:ext uri="{BB962C8B-B14F-4D97-AF65-F5344CB8AC3E}">
-        <p14:creationId xmlns:p14="http://schemas.microsoft.com/office/powerpoint/2010/main" val="415465657"/>
+        <p14:creationId xmlns:p14="http://schemas.microsoft.com/office/powerpoint/2010/main" val="95949011"/>
       </p:ext>
     </p:extLst>
   </p:cSld>
@@ -946,7 +827,7 @@
 
 <file path=ppt/slideLayouts/slideLayout3.xml><?xml version="1.0" encoding="utf-8"?>
 <p:sldLayout xmlns:a="http://schemas.openxmlformats.org/drawingml/2006/main" xmlns:r="http://schemas.openxmlformats.org/officeDocument/2006/relationships" xmlns:p="http://schemas.openxmlformats.org/presentationml/2006/main" type="secHead" preserve="1">
-  <p:cSld name="Section Header">
+  <p:cSld name="节标题">
     <p:spTree>
       <p:nvGrpSpPr>
         <p:cNvPr id="1" name=""/>
@@ -963,13 +844,7 @@
       </p:grpSpPr>
       <p:sp>
         <p:nvSpPr>
-          <p:cNvPr id="2" name="Title 1">
-            <a:extLst>
-              <a:ext uri="{FF2B5EF4-FFF2-40B4-BE49-F238E27FC236}">
-                <a16:creationId xmlns:a16="http://schemas.microsoft.com/office/drawing/2014/main" id="{6C05B0E8-232E-7081-9A0F-974B0D908617}"/>
-              </a:ext>
-            </a:extLst>
-          </p:cNvPr>
+          <p:cNvPr id="2" name="Title 1"/>
           <p:cNvSpPr>
             <a:spLocks noGrp="1"/>
           </p:cNvSpPr>
@@ -979,35 +854,29 @@
         </p:nvSpPr>
         <p:spPr>
           <a:xfrm>
-            <a:off x="831850" y="1709738"/>
-            <a:ext cx="10515600" cy="2852737"/>
+            <a:off x="729493" y="227965"/>
+            <a:ext cx="9221689" cy="380365"/>
           </a:xfrm>
         </p:spPr>
         <p:txBody>
           <a:bodyPr anchor="b"/>
           <a:lstStyle>
             <a:lvl1pPr>
-              <a:defRPr sz="6000"/>
+              <a:defRPr sz="800"/>
             </a:lvl1pPr>
           </a:lstStyle>
           <a:p>
             <a:r>
-              <a:rPr lang="en-US"/>
-              <a:t>Click to edit Master title style</a:t>
-            </a:r>
-            <a:endParaRPr lang="LID4096"/>
-          </a:p>
-        </p:txBody>
-      </p:sp>
-      <p:sp>
-        <p:nvSpPr>
-          <p:cNvPr id="3" name="Text Placeholder 2">
-            <a:extLst>
-              <a:ext uri="{FF2B5EF4-FFF2-40B4-BE49-F238E27FC236}">
-                <a16:creationId xmlns:a16="http://schemas.microsoft.com/office/drawing/2014/main" id="{AA9C6942-E3F3-727A-723E-9B0DB46D5C88}"/>
-              </a:ext>
-            </a:extLst>
-          </p:cNvPr>
+              <a:rPr lang="zh-CN" altLang="en-US"/>
+              <a:t>单击此处编辑母版标题样式</a:t>
+            </a:r>
+            <a:endParaRPr lang="en-US" dirty="0"/>
+          </a:p>
+        </p:txBody>
+      </p:sp>
+      <p:sp>
+        <p:nvSpPr>
+          <p:cNvPr id="3" name="Text Placeholder 2"/>
           <p:cNvSpPr>
             <a:spLocks noGrp="1"/>
           </p:cNvSpPr>
@@ -1017,8 +886,8 @@
         </p:nvSpPr>
         <p:spPr>
           <a:xfrm>
-            <a:off x="831850" y="4589463"/>
-            <a:ext cx="10515600" cy="1500187"/>
+            <a:off x="729493" y="611928"/>
+            <a:ext cx="9221689" cy="200025"/>
           </a:xfrm>
         </p:spPr>
         <p:txBody>
@@ -1026,7 +895,7 @@
           <a:lstStyle>
             <a:lvl1pPr marL="0" indent="0">
               <a:buNone/>
-              <a:defRPr sz="2400">
+              <a:defRPr sz="320">
                 <a:solidFill>
                   <a:schemeClr val="tx1">
                     <a:tint val="82000"/>
@@ -1034,9 +903,9 @@
                 </a:solidFill>
               </a:defRPr>
             </a:lvl1pPr>
-            <a:lvl2pPr marL="457200" indent="0">
-              <a:buNone/>
-              <a:defRPr sz="2000">
+            <a:lvl2pPr marL="60945" indent="0">
+              <a:buNone/>
+              <a:defRPr sz="267">
                 <a:solidFill>
                   <a:schemeClr val="tx1">
                     <a:tint val="82000"/>
@@ -1044,9 +913,9 @@
                 </a:solidFill>
               </a:defRPr>
             </a:lvl2pPr>
-            <a:lvl3pPr marL="914400" indent="0">
-              <a:buNone/>
-              <a:defRPr sz="1800">
+            <a:lvl3pPr marL="121890" indent="0">
+              <a:buNone/>
+              <a:defRPr sz="240">
                 <a:solidFill>
                   <a:schemeClr val="tx1">
                     <a:tint val="82000"/>
@@ -1054,9 +923,9 @@
                 </a:solidFill>
               </a:defRPr>
             </a:lvl3pPr>
-            <a:lvl4pPr marL="1371600" indent="0">
-              <a:buNone/>
-              <a:defRPr sz="1600">
+            <a:lvl4pPr marL="182834" indent="0">
+              <a:buNone/>
+              <a:defRPr sz="213">
                 <a:solidFill>
                   <a:schemeClr val="tx1">
                     <a:tint val="82000"/>
@@ -1064,9 +933,9 @@
                 </a:solidFill>
               </a:defRPr>
             </a:lvl4pPr>
-            <a:lvl5pPr marL="1828800" indent="0">
-              <a:buNone/>
-              <a:defRPr sz="1600">
+            <a:lvl5pPr marL="243779" indent="0">
+              <a:buNone/>
+              <a:defRPr sz="213">
                 <a:solidFill>
                   <a:schemeClr val="tx1">
                     <a:tint val="82000"/>
@@ -1074,9 +943,9 @@
                 </a:solidFill>
               </a:defRPr>
             </a:lvl5pPr>
-            <a:lvl6pPr marL="2286000" indent="0">
-              <a:buNone/>
-              <a:defRPr sz="1600">
+            <a:lvl6pPr marL="304724" indent="0">
+              <a:buNone/>
+              <a:defRPr sz="213">
                 <a:solidFill>
                   <a:schemeClr val="tx1">
                     <a:tint val="82000"/>
@@ -1084,9 +953,9 @@
                 </a:solidFill>
               </a:defRPr>
             </a:lvl6pPr>
-            <a:lvl7pPr marL="2743200" indent="0">
-              <a:buNone/>
-              <a:defRPr sz="1600">
+            <a:lvl7pPr marL="365669" indent="0">
+              <a:buNone/>
+              <a:defRPr sz="213">
                 <a:solidFill>
                   <a:schemeClr val="tx1">
                     <a:tint val="82000"/>
@@ -1094,9 +963,9 @@
                 </a:solidFill>
               </a:defRPr>
             </a:lvl7pPr>
-            <a:lvl8pPr marL="3200400" indent="0">
-              <a:buNone/>
-              <a:defRPr sz="1600">
+            <a:lvl8pPr marL="426613" indent="0">
+              <a:buNone/>
+              <a:defRPr sz="213">
                 <a:solidFill>
                   <a:schemeClr val="tx1">
                     <a:tint val="82000"/>
@@ -1104,9 +973,9 @@
                 </a:solidFill>
               </a:defRPr>
             </a:lvl8pPr>
-            <a:lvl9pPr marL="3657600" indent="0">
-              <a:buNone/>
-              <a:defRPr sz="1600">
+            <a:lvl9pPr marL="487558" indent="0">
+              <a:buNone/>
+              <a:defRPr sz="213">
                 <a:solidFill>
                   <a:schemeClr val="tx1">
                     <a:tint val="82000"/>
@@ -1118,21 +987,15 @@
           <a:p>
             <a:pPr lvl="0"/>
             <a:r>
-              <a:rPr lang="en-US"/>
-              <a:t>Click to edit Master text styles</a:t>
-            </a:r>
-          </a:p>
-        </p:txBody>
-      </p:sp>
-      <p:sp>
-        <p:nvSpPr>
-          <p:cNvPr id="4" name="Date Placeholder 3">
-            <a:extLst>
-              <a:ext uri="{FF2B5EF4-FFF2-40B4-BE49-F238E27FC236}">
-                <a16:creationId xmlns:a16="http://schemas.microsoft.com/office/drawing/2014/main" id="{EAA132B8-F049-875F-1873-7CD3BF871198}"/>
-              </a:ext>
-            </a:extLst>
-          </p:cNvPr>
+              <a:rPr lang="zh-CN" altLang="en-US"/>
+              <a:t>单击此处编辑母版文本样式</a:t>
+            </a:r>
+          </a:p>
+        </p:txBody>
+      </p:sp>
+      <p:sp>
+        <p:nvSpPr>
+          <p:cNvPr id="4" name="Date Placeholder 3"/>
           <p:cNvSpPr>
             <a:spLocks noGrp="1"/>
           </p:cNvSpPr>
@@ -1147,7 +1010,7 @@
           <a:p>
             <a:fld id="{F06130A7-DCD0-4467-8EE9-D424F9B7AB0B}" type="datetimeFigureOut">
               <a:rPr lang="LID4096" smtClean="0"/>
-              <a:t>09/09/2024</a:t>
+              <a:t>07/27/2025</a:t>
             </a:fld>
             <a:endParaRPr lang="LID4096"/>
           </a:p>
@@ -1155,13 +1018,7 @@
       </p:sp>
       <p:sp>
         <p:nvSpPr>
-          <p:cNvPr id="5" name="Footer Placeholder 4">
-            <a:extLst>
-              <a:ext uri="{FF2B5EF4-FFF2-40B4-BE49-F238E27FC236}">
-                <a16:creationId xmlns:a16="http://schemas.microsoft.com/office/drawing/2014/main" id="{109E5AD5-A2A0-EFDB-F719-907844C28ACC}"/>
-              </a:ext>
-            </a:extLst>
-          </p:cNvPr>
+          <p:cNvPr id="5" name="Footer Placeholder 4"/>
           <p:cNvSpPr>
             <a:spLocks noGrp="1"/>
           </p:cNvSpPr>
@@ -1180,13 +1037,7 @@
       </p:sp>
       <p:sp>
         <p:nvSpPr>
-          <p:cNvPr id="6" name="Slide Number Placeholder 5">
-            <a:extLst>
-              <a:ext uri="{FF2B5EF4-FFF2-40B4-BE49-F238E27FC236}">
-                <a16:creationId xmlns:a16="http://schemas.microsoft.com/office/drawing/2014/main" id="{587A4A32-E4EB-0C25-2CA9-BAD6712023D1}"/>
-              </a:ext>
-            </a:extLst>
-          </p:cNvPr>
+          <p:cNvPr id="6" name="Slide Number Placeholder 5"/>
           <p:cNvSpPr>
             <a:spLocks noGrp="1"/>
           </p:cNvSpPr>
@@ -1210,7 +1061,7 @@
     </p:spTree>
     <p:extLst>
       <p:ext uri="{BB962C8B-B14F-4D97-AF65-F5344CB8AC3E}">
-        <p14:creationId xmlns:p14="http://schemas.microsoft.com/office/powerpoint/2010/main" val="3967157421"/>
+        <p14:creationId xmlns:p14="http://schemas.microsoft.com/office/powerpoint/2010/main" val="3639393465"/>
       </p:ext>
     </p:extLst>
   </p:cSld>
@@ -1222,7 +1073,7 @@
 
 <file path=ppt/slideLayouts/slideLayout4.xml><?xml version="1.0" encoding="utf-8"?>
 <p:sldLayout xmlns:a="http://schemas.openxmlformats.org/drawingml/2006/main" xmlns:r="http://schemas.openxmlformats.org/officeDocument/2006/relationships" xmlns:p="http://schemas.openxmlformats.org/presentationml/2006/main" type="twoObj" preserve="1">
-  <p:cSld name="Two Content">
+  <p:cSld name="两栏内容">
     <p:spTree>
       <p:nvGrpSpPr>
         <p:cNvPr id="1" name=""/>
@@ -1239,13 +1090,7 @@
       </p:grpSpPr>
       <p:sp>
         <p:nvSpPr>
-          <p:cNvPr id="2" name="Title 1">
-            <a:extLst>
-              <a:ext uri="{FF2B5EF4-FFF2-40B4-BE49-F238E27FC236}">
-                <a16:creationId xmlns:a16="http://schemas.microsoft.com/office/drawing/2014/main" id="{0D16514F-9FB5-3629-0D56-4126206B4D14}"/>
-              </a:ext>
-            </a:extLst>
-          </p:cNvPr>
+          <p:cNvPr id="2" name="Title 1"/>
           <p:cNvSpPr>
             <a:spLocks noGrp="1"/>
           </p:cNvSpPr>
@@ -1259,22 +1104,16 @@
           <a:lstStyle/>
           <a:p>
             <a:r>
-              <a:rPr lang="en-US"/>
-              <a:t>Click to edit Master title style</a:t>
-            </a:r>
-            <a:endParaRPr lang="LID4096"/>
-          </a:p>
-        </p:txBody>
-      </p:sp>
-      <p:sp>
-        <p:nvSpPr>
-          <p:cNvPr id="3" name="Content Placeholder 2">
-            <a:extLst>
-              <a:ext uri="{FF2B5EF4-FFF2-40B4-BE49-F238E27FC236}">
-                <a16:creationId xmlns:a16="http://schemas.microsoft.com/office/drawing/2014/main" id="{59A723F2-1B0F-22AC-51D8-C5D4B4FECD1B}"/>
-              </a:ext>
-            </a:extLst>
-          </p:cNvPr>
+              <a:rPr lang="zh-CN" altLang="en-US"/>
+              <a:t>单击此处编辑母版标题样式</a:t>
+            </a:r>
+            <a:endParaRPr lang="en-US" dirty="0"/>
+          </a:p>
+        </p:txBody>
+      </p:sp>
+      <p:sp>
+        <p:nvSpPr>
+          <p:cNvPr id="3" name="Content Placeholder 2"/>
           <p:cNvSpPr>
             <a:spLocks noGrp="1"/>
           </p:cNvSpPr>
@@ -1284,8 +1123,8 @@
         </p:nvSpPr>
         <p:spPr>
           <a:xfrm>
-            <a:off x="838200" y="1825625"/>
-            <a:ext cx="5181600" cy="4351338"/>
+            <a:off x="735062" y="243417"/>
+            <a:ext cx="4544021" cy="580178"/>
           </a:xfrm>
         </p:spPr>
         <p:txBody>
@@ -1294,50 +1133,44 @@
           <a:p>
             <a:pPr lvl="0"/>
             <a:r>
-              <a:rPr lang="en-US"/>
-              <a:t>Click to edit Master text styles</a:t>
+              <a:rPr lang="zh-CN" altLang="en-US"/>
+              <a:t>单击此处编辑母版文本样式</a:t>
             </a:r>
           </a:p>
           <a:p>
             <a:pPr lvl="1"/>
             <a:r>
-              <a:rPr lang="en-US"/>
-              <a:t>Second level</a:t>
+              <a:rPr lang="zh-CN" altLang="en-US"/>
+              <a:t>二级</a:t>
             </a:r>
           </a:p>
           <a:p>
             <a:pPr lvl="2"/>
             <a:r>
-              <a:rPr lang="en-US"/>
-              <a:t>Third level</a:t>
+              <a:rPr lang="zh-CN" altLang="en-US"/>
+              <a:t>三级</a:t>
             </a:r>
           </a:p>
           <a:p>
             <a:pPr lvl="3"/>
             <a:r>
-              <a:rPr lang="en-US"/>
-              <a:t>Fourth level</a:t>
+              <a:rPr lang="zh-CN" altLang="en-US"/>
+              <a:t>四级</a:t>
             </a:r>
           </a:p>
           <a:p>
             <a:pPr lvl="4"/>
             <a:r>
-              <a:rPr lang="en-US"/>
-              <a:t>Fifth level</a:t>
-            </a:r>
-            <a:endParaRPr lang="LID4096"/>
-          </a:p>
-        </p:txBody>
-      </p:sp>
-      <p:sp>
-        <p:nvSpPr>
-          <p:cNvPr id="4" name="Content Placeholder 3">
-            <a:extLst>
-              <a:ext uri="{FF2B5EF4-FFF2-40B4-BE49-F238E27FC236}">
-                <a16:creationId xmlns:a16="http://schemas.microsoft.com/office/drawing/2014/main" id="{D9FC6F2C-A41A-284C-C0F4-A99F265397C5}"/>
-              </a:ext>
-            </a:extLst>
-          </p:cNvPr>
+              <a:rPr lang="zh-CN" altLang="en-US"/>
+              <a:t>五级</a:t>
+            </a:r>
+            <a:endParaRPr lang="en-US" dirty="0"/>
+          </a:p>
+        </p:txBody>
+      </p:sp>
+      <p:sp>
+        <p:nvSpPr>
+          <p:cNvPr id="4" name="Content Placeholder 3"/>
           <p:cNvSpPr>
             <a:spLocks noGrp="1"/>
           </p:cNvSpPr>
@@ -1347,8 +1180,8 @@
         </p:nvSpPr>
         <p:spPr>
           <a:xfrm>
-            <a:off x="6172200" y="1825625"/>
-            <a:ext cx="5181600" cy="4351338"/>
+            <a:off x="5412730" y="243417"/>
+            <a:ext cx="4544021" cy="580178"/>
           </a:xfrm>
         </p:spPr>
         <p:txBody>
@@ -1357,50 +1190,44 @@
           <a:p>
             <a:pPr lvl="0"/>
             <a:r>
-              <a:rPr lang="en-US"/>
-              <a:t>Click to edit Master text styles</a:t>
+              <a:rPr lang="zh-CN" altLang="en-US"/>
+              <a:t>单击此处编辑母版文本样式</a:t>
             </a:r>
           </a:p>
           <a:p>
             <a:pPr lvl="1"/>
             <a:r>
-              <a:rPr lang="en-US"/>
-              <a:t>Second level</a:t>
+              <a:rPr lang="zh-CN" altLang="en-US"/>
+              <a:t>二级</a:t>
             </a:r>
           </a:p>
           <a:p>
             <a:pPr lvl="2"/>
             <a:r>
-              <a:rPr lang="en-US"/>
-              <a:t>Third level</a:t>
+              <a:rPr lang="zh-CN" altLang="en-US"/>
+              <a:t>三级</a:t>
             </a:r>
           </a:p>
           <a:p>
             <a:pPr lvl="3"/>
             <a:r>
-              <a:rPr lang="en-US"/>
-              <a:t>Fourth level</a:t>
+              <a:rPr lang="zh-CN" altLang="en-US"/>
+              <a:t>四级</a:t>
             </a:r>
           </a:p>
           <a:p>
             <a:pPr lvl="4"/>
             <a:r>
-              <a:rPr lang="en-US"/>
-              <a:t>Fifth level</a:t>
-            </a:r>
-            <a:endParaRPr lang="LID4096"/>
-          </a:p>
-        </p:txBody>
-      </p:sp>
-      <p:sp>
-        <p:nvSpPr>
-          <p:cNvPr id="5" name="Date Placeholder 4">
-            <a:extLst>
-              <a:ext uri="{FF2B5EF4-FFF2-40B4-BE49-F238E27FC236}">
-                <a16:creationId xmlns:a16="http://schemas.microsoft.com/office/drawing/2014/main" id="{F78E94C1-6B37-DDFE-E2AA-9C834D00EDEA}"/>
-              </a:ext>
-            </a:extLst>
-          </p:cNvPr>
+              <a:rPr lang="zh-CN" altLang="en-US"/>
+              <a:t>五级</a:t>
+            </a:r>
+            <a:endParaRPr lang="en-US" dirty="0"/>
+          </a:p>
+        </p:txBody>
+      </p:sp>
+      <p:sp>
+        <p:nvSpPr>
+          <p:cNvPr id="5" name="Date Placeholder 4"/>
           <p:cNvSpPr>
             <a:spLocks noGrp="1"/>
           </p:cNvSpPr>
@@ -1415,7 +1242,7 @@
           <a:p>
             <a:fld id="{F06130A7-DCD0-4467-8EE9-D424F9B7AB0B}" type="datetimeFigureOut">
               <a:rPr lang="LID4096" smtClean="0"/>
-              <a:t>09/09/2024</a:t>
+              <a:t>07/27/2025</a:t>
             </a:fld>
             <a:endParaRPr lang="LID4096"/>
           </a:p>
@@ -1423,13 +1250,7 @@
       </p:sp>
       <p:sp>
         <p:nvSpPr>
-          <p:cNvPr id="6" name="Footer Placeholder 5">
-            <a:extLst>
-              <a:ext uri="{FF2B5EF4-FFF2-40B4-BE49-F238E27FC236}">
-                <a16:creationId xmlns:a16="http://schemas.microsoft.com/office/drawing/2014/main" id="{0B149034-04F5-E921-0D4F-EAE7D2C2652D}"/>
-              </a:ext>
-            </a:extLst>
-          </p:cNvPr>
+          <p:cNvPr id="6" name="Footer Placeholder 5"/>
           <p:cNvSpPr>
             <a:spLocks noGrp="1"/>
           </p:cNvSpPr>
@@ -1448,13 +1269,7 @@
       </p:sp>
       <p:sp>
         <p:nvSpPr>
-          <p:cNvPr id="7" name="Slide Number Placeholder 6">
-            <a:extLst>
-              <a:ext uri="{FF2B5EF4-FFF2-40B4-BE49-F238E27FC236}">
-                <a16:creationId xmlns:a16="http://schemas.microsoft.com/office/drawing/2014/main" id="{24A75539-0058-EAF8-D3AB-0DF70BF7F794}"/>
-              </a:ext>
-            </a:extLst>
-          </p:cNvPr>
+          <p:cNvPr id="7" name="Slide Number Placeholder 6"/>
           <p:cNvSpPr>
             <a:spLocks noGrp="1"/>
           </p:cNvSpPr>
@@ -1478,7 +1293,7 @@
     </p:spTree>
     <p:extLst>
       <p:ext uri="{BB962C8B-B14F-4D97-AF65-F5344CB8AC3E}">
-        <p14:creationId xmlns:p14="http://schemas.microsoft.com/office/powerpoint/2010/main" val="10488812"/>
+        <p14:creationId xmlns:p14="http://schemas.microsoft.com/office/powerpoint/2010/main" val="2623328874"/>
       </p:ext>
     </p:extLst>
   </p:cSld>
@@ -1490,7 +1305,7 @@
 
 <file path=ppt/slideLayouts/slideLayout5.xml><?xml version="1.0" encoding="utf-8"?>
 <p:sldLayout xmlns:a="http://schemas.openxmlformats.org/drawingml/2006/main" xmlns:r="http://schemas.openxmlformats.org/officeDocument/2006/relationships" xmlns:p="http://schemas.openxmlformats.org/presentationml/2006/main" type="twoTxTwoObj" preserve="1">
-  <p:cSld name="Comparison">
+  <p:cSld name="比较">
     <p:spTree>
       <p:nvGrpSpPr>
         <p:cNvPr id="1" name=""/>
@@ -1507,13 +1322,7 @@
       </p:grpSpPr>
       <p:sp>
         <p:nvSpPr>
-          <p:cNvPr id="2" name="Title 1">
-            <a:extLst>
-              <a:ext uri="{FF2B5EF4-FFF2-40B4-BE49-F238E27FC236}">
-                <a16:creationId xmlns:a16="http://schemas.microsoft.com/office/drawing/2014/main" id="{77A448AB-A074-9433-D19B-164FCF02903F}"/>
-              </a:ext>
-            </a:extLst>
-          </p:cNvPr>
+          <p:cNvPr id="2" name="Title 1"/>
           <p:cNvSpPr>
             <a:spLocks noGrp="1"/>
           </p:cNvSpPr>
@@ -1523,8 +1332,8 @@
         </p:nvSpPr>
         <p:spPr>
           <a:xfrm>
-            <a:off x="839788" y="365125"/>
-            <a:ext cx="10515600" cy="1325563"/>
+            <a:off x="736455" y="48683"/>
+            <a:ext cx="9221689" cy="176742"/>
           </a:xfrm>
         </p:spPr>
         <p:txBody>
@@ -1532,22 +1341,16 @@
           <a:lstStyle/>
           <a:p>
             <a:r>
-              <a:rPr lang="en-US"/>
-              <a:t>Click to edit Master title style</a:t>
-            </a:r>
-            <a:endParaRPr lang="LID4096"/>
-          </a:p>
-        </p:txBody>
-      </p:sp>
-      <p:sp>
-        <p:nvSpPr>
-          <p:cNvPr id="3" name="Text Placeholder 2">
-            <a:extLst>
-              <a:ext uri="{FF2B5EF4-FFF2-40B4-BE49-F238E27FC236}">
-                <a16:creationId xmlns:a16="http://schemas.microsoft.com/office/drawing/2014/main" id="{5C6E71F7-163F-DFEB-C0B4-1AF5189E8367}"/>
-              </a:ext>
-            </a:extLst>
-          </p:cNvPr>
+              <a:rPr lang="zh-CN" altLang="en-US"/>
+              <a:t>单击此处编辑母版标题样式</a:t>
+            </a:r>
+            <a:endParaRPr lang="en-US" dirty="0"/>
+          </a:p>
+        </p:txBody>
+      </p:sp>
+      <p:sp>
+        <p:nvSpPr>
+          <p:cNvPr id="3" name="Text Placeholder 2"/>
           <p:cNvSpPr>
             <a:spLocks noGrp="1"/>
           </p:cNvSpPr>
@@ -1557,8 +1360,8 @@
         </p:nvSpPr>
         <p:spPr>
           <a:xfrm>
-            <a:off x="839788" y="1681163"/>
-            <a:ext cx="5157787" cy="823912"/>
+            <a:off x="736455" y="224155"/>
+            <a:ext cx="4523138" cy="109855"/>
           </a:xfrm>
         </p:spPr>
         <p:txBody>
@@ -1566,59 +1369,53 @@
           <a:lstStyle>
             <a:lvl1pPr marL="0" indent="0">
               <a:buNone/>
-              <a:defRPr sz="2400" b="1"/>
+              <a:defRPr sz="320" b="1"/>
             </a:lvl1pPr>
-            <a:lvl2pPr marL="457200" indent="0">
-              <a:buNone/>
-              <a:defRPr sz="2000" b="1"/>
+            <a:lvl2pPr marL="60945" indent="0">
+              <a:buNone/>
+              <a:defRPr sz="267" b="1"/>
             </a:lvl2pPr>
-            <a:lvl3pPr marL="914400" indent="0">
-              <a:buNone/>
-              <a:defRPr sz="1800" b="1"/>
+            <a:lvl3pPr marL="121890" indent="0">
+              <a:buNone/>
+              <a:defRPr sz="240" b="1"/>
             </a:lvl3pPr>
-            <a:lvl4pPr marL="1371600" indent="0">
-              <a:buNone/>
-              <a:defRPr sz="1600" b="1"/>
+            <a:lvl4pPr marL="182834" indent="0">
+              <a:buNone/>
+              <a:defRPr sz="213" b="1"/>
             </a:lvl4pPr>
-            <a:lvl5pPr marL="1828800" indent="0">
-              <a:buNone/>
-              <a:defRPr sz="1600" b="1"/>
+            <a:lvl5pPr marL="243779" indent="0">
+              <a:buNone/>
+              <a:defRPr sz="213" b="1"/>
             </a:lvl5pPr>
-            <a:lvl6pPr marL="2286000" indent="0">
-              <a:buNone/>
-              <a:defRPr sz="1600" b="1"/>
+            <a:lvl6pPr marL="304724" indent="0">
+              <a:buNone/>
+              <a:defRPr sz="213" b="1"/>
             </a:lvl6pPr>
-            <a:lvl7pPr marL="2743200" indent="0">
-              <a:buNone/>
-              <a:defRPr sz="1600" b="1"/>
+            <a:lvl7pPr marL="365669" indent="0">
+              <a:buNone/>
+              <a:defRPr sz="213" b="1"/>
             </a:lvl7pPr>
-            <a:lvl8pPr marL="3200400" indent="0">
-              <a:buNone/>
-              <a:defRPr sz="1600" b="1"/>
+            <a:lvl8pPr marL="426613" indent="0">
+              <a:buNone/>
+              <a:defRPr sz="213" b="1"/>
             </a:lvl8pPr>
-            <a:lvl9pPr marL="3657600" indent="0">
-              <a:buNone/>
-              <a:defRPr sz="1600" b="1"/>
+            <a:lvl9pPr marL="487558" indent="0">
+              <a:buNone/>
+              <a:defRPr sz="213" b="1"/>
             </a:lvl9pPr>
           </a:lstStyle>
           <a:p>
             <a:pPr lvl="0"/>
             <a:r>
-              <a:rPr lang="en-US"/>
-              <a:t>Click to edit Master text styles</a:t>
-            </a:r>
-          </a:p>
-        </p:txBody>
-      </p:sp>
-      <p:sp>
-        <p:nvSpPr>
-          <p:cNvPr id="4" name="Content Placeholder 3">
-            <a:extLst>
-              <a:ext uri="{FF2B5EF4-FFF2-40B4-BE49-F238E27FC236}">
-                <a16:creationId xmlns:a16="http://schemas.microsoft.com/office/drawing/2014/main" id="{AD3EA4A3-5B66-9562-7628-0B772019529E}"/>
-              </a:ext>
-            </a:extLst>
-          </p:cNvPr>
+              <a:rPr lang="zh-CN" altLang="en-US"/>
+              <a:t>单击此处编辑母版文本样式</a:t>
+            </a:r>
+          </a:p>
+        </p:txBody>
+      </p:sp>
+      <p:sp>
+        <p:nvSpPr>
+          <p:cNvPr id="4" name="Content Placeholder 3"/>
           <p:cNvSpPr>
             <a:spLocks noGrp="1"/>
           </p:cNvSpPr>
@@ -1628,8 +1425,8 @@
         </p:nvSpPr>
         <p:spPr>
           <a:xfrm>
-            <a:off x="839788" y="2505075"/>
-            <a:ext cx="5157787" cy="3684588"/>
+            <a:off x="736455" y="334010"/>
+            <a:ext cx="4523138" cy="491278"/>
           </a:xfrm>
         </p:spPr>
         <p:txBody>
@@ -1638,50 +1435,44 @@
           <a:p>
             <a:pPr lvl="0"/>
             <a:r>
-              <a:rPr lang="en-US"/>
-              <a:t>Click to edit Master text styles</a:t>
+              <a:rPr lang="zh-CN" altLang="en-US"/>
+              <a:t>单击此处编辑母版文本样式</a:t>
             </a:r>
           </a:p>
           <a:p>
             <a:pPr lvl="1"/>
             <a:r>
-              <a:rPr lang="en-US"/>
-              <a:t>Second level</a:t>
+              <a:rPr lang="zh-CN" altLang="en-US"/>
+              <a:t>二级</a:t>
             </a:r>
           </a:p>
           <a:p>
             <a:pPr lvl="2"/>
             <a:r>
-              <a:rPr lang="en-US"/>
-              <a:t>Third level</a:t>
+              <a:rPr lang="zh-CN" altLang="en-US"/>
+              <a:t>三级</a:t>
             </a:r>
           </a:p>
           <a:p>
             <a:pPr lvl="3"/>
             <a:r>
-              <a:rPr lang="en-US"/>
-              <a:t>Fourth level</a:t>
+              <a:rPr lang="zh-CN" altLang="en-US"/>
+              <a:t>四级</a:t>
             </a:r>
           </a:p>
           <a:p>
             <a:pPr lvl="4"/>
             <a:r>
-              <a:rPr lang="en-US"/>
-              <a:t>Fifth level</a:t>
-            </a:r>
-            <a:endParaRPr lang="LID4096"/>
-          </a:p>
-        </p:txBody>
-      </p:sp>
-      <p:sp>
-        <p:nvSpPr>
-          <p:cNvPr id="5" name="Text Placeholder 4">
-            <a:extLst>
-              <a:ext uri="{FF2B5EF4-FFF2-40B4-BE49-F238E27FC236}">
-                <a16:creationId xmlns:a16="http://schemas.microsoft.com/office/drawing/2014/main" id="{A5BE2461-A03B-17F7-DAD5-63313E4240B9}"/>
-              </a:ext>
-            </a:extLst>
-          </p:cNvPr>
+              <a:rPr lang="zh-CN" altLang="en-US"/>
+              <a:t>五级</a:t>
+            </a:r>
+            <a:endParaRPr lang="en-US" dirty="0"/>
+          </a:p>
+        </p:txBody>
+      </p:sp>
+      <p:sp>
+        <p:nvSpPr>
+          <p:cNvPr id="5" name="Text Placeholder 4"/>
           <p:cNvSpPr>
             <a:spLocks noGrp="1"/>
           </p:cNvSpPr>
@@ -1691,8 +1482,8 @@
         </p:nvSpPr>
         <p:spPr>
           <a:xfrm>
-            <a:off x="6172200" y="1681163"/>
-            <a:ext cx="5183188" cy="823912"/>
+            <a:off x="5412730" y="224155"/>
+            <a:ext cx="4545413" cy="109855"/>
           </a:xfrm>
         </p:spPr>
         <p:txBody>
@@ -1700,59 +1491,53 @@
           <a:lstStyle>
             <a:lvl1pPr marL="0" indent="0">
               <a:buNone/>
-              <a:defRPr sz="2400" b="1"/>
+              <a:defRPr sz="320" b="1"/>
             </a:lvl1pPr>
-            <a:lvl2pPr marL="457200" indent="0">
-              <a:buNone/>
-              <a:defRPr sz="2000" b="1"/>
+            <a:lvl2pPr marL="60945" indent="0">
+              <a:buNone/>
+              <a:defRPr sz="267" b="1"/>
             </a:lvl2pPr>
-            <a:lvl3pPr marL="914400" indent="0">
-              <a:buNone/>
-              <a:defRPr sz="1800" b="1"/>
+            <a:lvl3pPr marL="121890" indent="0">
+              <a:buNone/>
+              <a:defRPr sz="240" b="1"/>
             </a:lvl3pPr>
-            <a:lvl4pPr marL="1371600" indent="0">
-              <a:buNone/>
-              <a:defRPr sz="1600" b="1"/>
+            <a:lvl4pPr marL="182834" indent="0">
+              <a:buNone/>
+              <a:defRPr sz="213" b="1"/>
             </a:lvl4pPr>
-            <a:lvl5pPr marL="1828800" indent="0">
-              <a:buNone/>
-              <a:defRPr sz="1600" b="1"/>
+            <a:lvl5pPr marL="243779" indent="0">
+              <a:buNone/>
+              <a:defRPr sz="213" b="1"/>
             </a:lvl5pPr>
-            <a:lvl6pPr marL="2286000" indent="0">
-              <a:buNone/>
-              <a:defRPr sz="1600" b="1"/>
+            <a:lvl6pPr marL="304724" indent="0">
+              <a:buNone/>
+              <a:defRPr sz="213" b="1"/>
             </a:lvl6pPr>
-            <a:lvl7pPr marL="2743200" indent="0">
-              <a:buNone/>
-              <a:defRPr sz="1600" b="1"/>
+            <a:lvl7pPr marL="365669" indent="0">
+              <a:buNone/>
+              <a:defRPr sz="213" b="1"/>
             </a:lvl7pPr>
-            <a:lvl8pPr marL="3200400" indent="0">
-              <a:buNone/>
-              <a:defRPr sz="1600" b="1"/>
+            <a:lvl8pPr marL="426613" indent="0">
+              <a:buNone/>
+              <a:defRPr sz="213" b="1"/>
             </a:lvl8pPr>
-            <a:lvl9pPr marL="3657600" indent="0">
-              <a:buNone/>
-              <a:defRPr sz="1600" b="1"/>
+            <a:lvl9pPr marL="487558" indent="0">
+              <a:buNone/>
+              <a:defRPr sz="213" b="1"/>
             </a:lvl9pPr>
           </a:lstStyle>
           <a:p>
             <a:pPr lvl="0"/>
             <a:r>
-              <a:rPr lang="en-US"/>
-              <a:t>Click to edit Master text styles</a:t>
-            </a:r>
-          </a:p>
-        </p:txBody>
-      </p:sp>
-      <p:sp>
-        <p:nvSpPr>
-          <p:cNvPr id="6" name="Content Placeholder 5">
-            <a:extLst>
-              <a:ext uri="{FF2B5EF4-FFF2-40B4-BE49-F238E27FC236}">
-                <a16:creationId xmlns:a16="http://schemas.microsoft.com/office/drawing/2014/main" id="{802118D0-04F4-E656-7822-3C9D20ABE01B}"/>
-              </a:ext>
-            </a:extLst>
-          </p:cNvPr>
+              <a:rPr lang="zh-CN" altLang="en-US"/>
+              <a:t>单击此处编辑母版文本样式</a:t>
+            </a:r>
+          </a:p>
+        </p:txBody>
+      </p:sp>
+      <p:sp>
+        <p:nvSpPr>
+          <p:cNvPr id="6" name="Content Placeholder 5"/>
           <p:cNvSpPr>
             <a:spLocks noGrp="1"/>
           </p:cNvSpPr>
@@ -1762,8 +1547,8 @@
         </p:nvSpPr>
         <p:spPr>
           <a:xfrm>
-            <a:off x="6172200" y="2505075"/>
-            <a:ext cx="5183188" cy="3684588"/>
+            <a:off x="5412730" y="334010"/>
+            <a:ext cx="4545413" cy="491278"/>
           </a:xfrm>
         </p:spPr>
         <p:txBody>
@@ -1772,50 +1557,44 @@
           <a:p>
             <a:pPr lvl="0"/>
             <a:r>
-              <a:rPr lang="en-US"/>
-              <a:t>Click to edit Master text styles</a:t>
+              <a:rPr lang="zh-CN" altLang="en-US"/>
+              <a:t>单击此处编辑母版文本样式</a:t>
             </a:r>
           </a:p>
           <a:p>
             <a:pPr lvl="1"/>
             <a:r>
-              <a:rPr lang="en-US"/>
-              <a:t>Second level</a:t>
+              <a:rPr lang="zh-CN" altLang="en-US"/>
+              <a:t>二级</a:t>
             </a:r>
           </a:p>
           <a:p>
             <a:pPr lvl="2"/>
             <a:r>
-              <a:rPr lang="en-US"/>
-              <a:t>Third level</a:t>
+              <a:rPr lang="zh-CN" altLang="en-US"/>
+              <a:t>三级</a:t>
             </a:r>
           </a:p>
           <a:p>
             <a:pPr lvl="3"/>
             <a:r>
-              <a:rPr lang="en-US"/>
-              <a:t>Fourth level</a:t>
+              <a:rPr lang="zh-CN" altLang="en-US"/>
+              <a:t>四级</a:t>
             </a:r>
           </a:p>
           <a:p>
             <a:pPr lvl="4"/>
             <a:r>
-              <a:rPr lang="en-US"/>
-              <a:t>Fifth level</a:t>
-            </a:r>
-            <a:endParaRPr lang="LID4096"/>
-          </a:p>
-        </p:txBody>
-      </p:sp>
-      <p:sp>
-        <p:nvSpPr>
-          <p:cNvPr id="7" name="Date Placeholder 6">
-            <a:extLst>
-              <a:ext uri="{FF2B5EF4-FFF2-40B4-BE49-F238E27FC236}">
-                <a16:creationId xmlns:a16="http://schemas.microsoft.com/office/drawing/2014/main" id="{CBBCCB5B-F9DA-B72D-627B-02A9E95E9449}"/>
-              </a:ext>
-            </a:extLst>
-          </p:cNvPr>
+              <a:rPr lang="zh-CN" altLang="en-US"/>
+              <a:t>五级</a:t>
+            </a:r>
+            <a:endParaRPr lang="en-US" dirty="0"/>
+          </a:p>
+        </p:txBody>
+      </p:sp>
+      <p:sp>
+        <p:nvSpPr>
+          <p:cNvPr id="7" name="Date Placeholder 6"/>
           <p:cNvSpPr>
             <a:spLocks noGrp="1"/>
           </p:cNvSpPr>
@@ -1830,7 +1609,7 @@
           <a:p>
             <a:fld id="{F06130A7-DCD0-4467-8EE9-D424F9B7AB0B}" type="datetimeFigureOut">
               <a:rPr lang="LID4096" smtClean="0"/>
-              <a:t>09/09/2024</a:t>
+              <a:t>07/27/2025</a:t>
             </a:fld>
             <a:endParaRPr lang="LID4096"/>
           </a:p>
@@ -1838,13 +1617,7 @@
       </p:sp>
       <p:sp>
         <p:nvSpPr>
-          <p:cNvPr id="8" name="Footer Placeholder 7">
-            <a:extLst>
-              <a:ext uri="{FF2B5EF4-FFF2-40B4-BE49-F238E27FC236}">
-                <a16:creationId xmlns:a16="http://schemas.microsoft.com/office/drawing/2014/main" id="{5B16255B-434F-CF73-1CEF-2038AB7F9316}"/>
-              </a:ext>
-            </a:extLst>
-          </p:cNvPr>
+          <p:cNvPr id="8" name="Footer Placeholder 7"/>
           <p:cNvSpPr>
             <a:spLocks noGrp="1"/>
           </p:cNvSpPr>
@@ -1863,13 +1636,7 @@
       </p:sp>
       <p:sp>
         <p:nvSpPr>
-          <p:cNvPr id="9" name="Slide Number Placeholder 8">
-            <a:extLst>
-              <a:ext uri="{FF2B5EF4-FFF2-40B4-BE49-F238E27FC236}">
-                <a16:creationId xmlns:a16="http://schemas.microsoft.com/office/drawing/2014/main" id="{AE01716A-C802-A14C-4EB9-509CD3CC8956}"/>
-              </a:ext>
-            </a:extLst>
-          </p:cNvPr>
+          <p:cNvPr id="9" name="Slide Number Placeholder 8"/>
           <p:cNvSpPr>
             <a:spLocks noGrp="1"/>
           </p:cNvSpPr>
@@ -1893,7 +1660,7 @@
     </p:spTree>
     <p:extLst>
       <p:ext uri="{BB962C8B-B14F-4D97-AF65-F5344CB8AC3E}">
-        <p14:creationId xmlns:p14="http://schemas.microsoft.com/office/powerpoint/2010/main" val="2955687632"/>
+        <p14:creationId xmlns:p14="http://schemas.microsoft.com/office/powerpoint/2010/main" val="4228613478"/>
       </p:ext>
     </p:extLst>
   </p:cSld>
@@ -1905,7 +1672,7 @@
 
 <file path=ppt/slideLayouts/slideLayout6.xml><?xml version="1.0" encoding="utf-8"?>
 <p:sldLayout xmlns:a="http://schemas.openxmlformats.org/drawingml/2006/main" xmlns:r="http://schemas.openxmlformats.org/officeDocument/2006/relationships" xmlns:p="http://schemas.openxmlformats.org/presentationml/2006/main" type="titleOnly" preserve="1">
-  <p:cSld name="Title Only">
+  <p:cSld name="仅标题">
     <p:spTree>
       <p:nvGrpSpPr>
         <p:cNvPr id="1" name=""/>
@@ -1922,13 +1689,7 @@
       </p:grpSpPr>
       <p:sp>
         <p:nvSpPr>
-          <p:cNvPr id="2" name="Title 1">
-            <a:extLst>
-              <a:ext uri="{FF2B5EF4-FFF2-40B4-BE49-F238E27FC236}">
-                <a16:creationId xmlns:a16="http://schemas.microsoft.com/office/drawing/2014/main" id="{38503BD0-E0A1-F374-6906-87795011A28C}"/>
-              </a:ext>
-            </a:extLst>
-          </p:cNvPr>
+          <p:cNvPr id="2" name="Title 1"/>
           <p:cNvSpPr>
             <a:spLocks noGrp="1"/>
           </p:cNvSpPr>
@@ -1942,22 +1703,16 @@
           <a:lstStyle/>
           <a:p>
             <a:r>
-              <a:rPr lang="en-US"/>
-              <a:t>Click to edit Master title style</a:t>
-            </a:r>
-            <a:endParaRPr lang="LID4096"/>
-          </a:p>
-        </p:txBody>
-      </p:sp>
-      <p:sp>
-        <p:nvSpPr>
-          <p:cNvPr id="3" name="Date Placeholder 2">
-            <a:extLst>
-              <a:ext uri="{FF2B5EF4-FFF2-40B4-BE49-F238E27FC236}">
-                <a16:creationId xmlns:a16="http://schemas.microsoft.com/office/drawing/2014/main" id="{8FA50A00-0967-A9DE-DD67-CCD52B169D05}"/>
-              </a:ext>
-            </a:extLst>
-          </p:cNvPr>
+              <a:rPr lang="zh-CN" altLang="en-US"/>
+              <a:t>单击此处编辑母版标题样式</a:t>
+            </a:r>
+            <a:endParaRPr lang="en-US" dirty="0"/>
+          </a:p>
+        </p:txBody>
+      </p:sp>
+      <p:sp>
+        <p:nvSpPr>
+          <p:cNvPr id="3" name="Date Placeholder 2"/>
           <p:cNvSpPr>
             <a:spLocks noGrp="1"/>
           </p:cNvSpPr>
@@ -1972,7 +1727,7 @@
           <a:p>
             <a:fld id="{F06130A7-DCD0-4467-8EE9-D424F9B7AB0B}" type="datetimeFigureOut">
               <a:rPr lang="LID4096" smtClean="0"/>
-              <a:t>09/09/2024</a:t>
+              <a:t>07/27/2025</a:t>
             </a:fld>
             <a:endParaRPr lang="LID4096"/>
           </a:p>
@@ -1980,13 +1735,7 @@
       </p:sp>
       <p:sp>
         <p:nvSpPr>
-          <p:cNvPr id="4" name="Footer Placeholder 3">
-            <a:extLst>
-              <a:ext uri="{FF2B5EF4-FFF2-40B4-BE49-F238E27FC236}">
-                <a16:creationId xmlns:a16="http://schemas.microsoft.com/office/drawing/2014/main" id="{B3D17286-2F1F-A9FB-8ABB-E561141CE48B}"/>
-              </a:ext>
-            </a:extLst>
-          </p:cNvPr>
+          <p:cNvPr id="4" name="Footer Placeholder 3"/>
           <p:cNvSpPr>
             <a:spLocks noGrp="1"/>
           </p:cNvSpPr>
@@ -2005,13 +1754,7 @@
       </p:sp>
       <p:sp>
         <p:nvSpPr>
-          <p:cNvPr id="5" name="Slide Number Placeholder 4">
-            <a:extLst>
-              <a:ext uri="{FF2B5EF4-FFF2-40B4-BE49-F238E27FC236}">
-                <a16:creationId xmlns:a16="http://schemas.microsoft.com/office/drawing/2014/main" id="{791671A2-1281-2E22-5C59-4C7D6CE8BCEB}"/>
-              </a:ext>
-            </a:extLst>
-          </p:cNvPr>
+          <p:cNvPr id="5" name="Slide Number Placeholder 4"/>
           <p:cNvSpPr>
             <a:spLocks noGrp="1"/>
           </p:cNvSpPr>
@@ -2035,7 +1778,7 @@
     </p:spTree>
     <p:extLst>
       <p:ext uri="{BB962C8B-B14F-4D97-AF65-F5344CB8AC3E}">
-        <p14:creationId xmlns:p14="http://schemas.microsoft.com/office/powerpoint/2010/main" val="276077347"/>
+        <p14:creationId xmlns:p14="http://schemas.microsoft.com/office/powerpoint/2010/main" val="537301688"/>
       </p:ext>
     </p:extLst>
   </p:cSld>
@@ -2047,7 +1790,7 @@
 
 <file path=ppt/slideLayouts/slideLayout7.xml><?xml version="1.0" encoding="utf-8"?>
 <p:sldLayout xmlns:a="http://schemas.openxmlformats.org/drawingml/2006/main" xmlns:r="http://schemas.openxmlformats.org/officeDocument/2006/relationships" xmlns:p="http://schemas.openxmlformats.org/presentationml/2006/main" type="blank" preserve="1">
-  <p:cSld name="Blank">
+  <p:cSld name="空白">
     <p:spTree>
       <p:nvGrpSpPr>
         <p:cNvPr id="1" name=""/>
@@ -2064,13 +1807,7 @@
       </p:grpSpPr>
       <p:sp>
         <p:nvSpPr>
-          <p:cNvPr id="2" name="Date Placeholder 1">
-            <a:extLst>
-              <a:ext uri="{FF2B5EF4-FFF2-40B4-BE49-F238E27FC236}">
-                <a16:creationId xmlns:a16="http://schemas.microsoft.com/office/drawing/2014/main" id="{9119ECD3-0A0E-C23A-B257-62F115E983AC}"/>
-              </a:ext>
-            </a:extLst>
-          </p:cNvPr>
+          <p:cNvPr id="2" name="Date Placeholder 1"/>
           <p:cNvSpPr>
             <a:spLocks noGrp="1"/>
           </p:cNvSpPr>
@@ -2085,7 +1822,7 @@
           <a:p>
             <a:fld id="{F06130A7-DCD0-4467-8EE9-D424F9B7AB0B}" type="datetimeFigureOut">
               <a:rPr lang="LID4096" smtClean="0"/>
-              <a:t>09/09/2024</a:t>
+              <a:t>07/27/2025</a:t>
             </a:fld>
             <a:endParaRPr lang="LID4096"/>
           </a:p>
@@ -2093,13 +1830,7 @@
       </p:sp>
       <p:sp>
         <p:nvSpPr>
-          <p:cNvPr id="3" name="Footer Placeholder 2">
-            <a:extLst>
-              <a:ext uri="{FF2B5EF4-FFF2-40B4-BE49-F238E27FC236}">
-                <a16:creationId xmlns:a16="http://schemas.microsoft.com/office/drawing/2014/main" id="{EDACBC15-D7CC-1452-5A0F-51096D04DD75}"/>
-              </a:ext>
-            </a:extLst>
-          </p:cNvPr>
+          <p:cNvPr id="3" name="Footer Placeholder 2"/>
           <p:cNvSpPr>
             <a:spLocks noGrp="1"/>
           </p:cNvSpPr>
@@ -2118,13 +1849,7 @@
       </p:sp>
       <p:sp>
         <p:nvSpPr>
-          <p:cNvPr id="4" name="Slide Number Placeholder 3">
-            <a:extLst>
-              <a:ext uri="{FF2B5EF4-FFF2-40B4-BE49-F238E27FC236}">
-                <a16:creationId xmlns:a16="http://schemas.microsoft.com/office/drawing/2014/main" id="{5C77FC15-3369-CE5B-CCCA-6C451EEC3C21}"/>
-              </a:ext>
-            </a:extLst>
-          </p:cNvPr>
+          <p:cNvPr id="4" name="Slide Number Placeholder 3"/>
           <p:cNvSpPr>
             <a:spLocks noGrp="1"/>
           </p:cNvSpPr>
@@ -2148,7 +1873,7 @@
     </p:spTree>
     <p:extLst>
       <p:ext uri="{BB962C8B-B14F-4D97-AF65-F5344CB8AC3E}">
-        <p14:creationId xmlns:p14="http://schemas.microsoft.com/office/powerpoint/2010/main" val="3264723481"/>
+        <p14:creationId xmlns:p14="http://schemas.microsoft.com/office/powerpoint/2010/main" val="2048037141"/>
       </p:ext>
     </p:extLst>
   </p:cSld>
@@ -2160,7 +1885,7 @@
 
 <file path=ppt/slideLayouts/slideLayout8.xml><?xml version="1.0" encoding="utf-8"?>
 <p:sldLayout xmlns:a="http://schemas.openxmlformats.org/drawingml/2006/main" xmlns:r="http://schemas.openxmlformats.org/officeDocument/2006/relationships" xmlns:p="http://schemas.openxmlformats.org/presentationml/2006/main" type="objTx" preserve="1">
-  <p:cSld name="Content with Caption">
+  <p:cSld name="内容与标题">
     <p:spTree>
       <p:nvGrpSpPr>
         <p:cNvPr id="1" name=""/>
@@ -2177,13 +1902,7 @@
       </p:grpSpPr>
       <p:sp>
         <p:nvSpPr>
-          <p:cNvPr id="2" name="Title 1">
-            <a:extLst>
-              <a:ext uri="{FF2B5EF4-FFF2-40B4-BE49-F238E27FC236}">
-                <a16:creationId xmlns:a16="http://schemas.microsoft.com/office/drawing/2014/main" id="{C9F8E83E-E26D-4C4F-07CA-8ABDF624C66D}"/>
-              </a:ext>
-            </a:extLst>
-          </p:cNvPr>
+          <p:cNvPr id="2" name="Title 1"/>
           <p:cNvSpPr>
             <a:spLocks noGrp="1"/>
           </p:cNvSpPr>
@@ -2193,35 +1912,29 @@
         </p:nvSpPr>
         <p:spPr>
           <a:xfrm>
-            <a:off x="839788" y="457200"/>
-            <a:ext cx="3932237" cy="1600200"/>
+            <a:off x="736455" y="60960"/>
+            <a:ext cx="3448388" cy="213360"/>
           </a:xfrm>
         </p:spPr>
         <p:txBody>
           <a:bodyPr anchor="b"/>
           <a:lstStyle>
             <a:lvl1pPr>
-              <a:defRPr sz="3200"/>
+              <a:defRPr sz="427"/>
             </a:lvl1pPr>
           </a:lstStyle>
           <a:p>
             <a:r>
-              <a:rPr lang="en-US"/>
-              <a:t>Click to edit Master title style</a:t>
-            </a:r>
-            <a:endParaRPr lang="LID4096"/>
-          </a:p>
-        </p:txBody>
-      </p:sp>
-      <p:sp>
-        <p:nvSpPr>
-          <p:cNvPr id="3" name="Content Placeholder 2">
-            <a:extLst>
-              <a:ext uri="{FF2B5EF4-FFF2-40B4-BE49-F238E27FC236}">
-                <a16:creationId xmlns:a16="http://schemas.microsoft.com/office/drawing/2014/main" id="{EE60FA88-9AC8-28E6-E955-AE3E96F8643A}"/>
-              </a:ext>
-            </a:extLst>
-          </p:cNvPr>
+              <a:rPr lang="zh-CN" altLang="en-US"/>
+              <a:t>单击此处编辑母版标题样式</a:t>
+            </a:r>
+            <a:endParaRPr lang="en-US" dirty="0"/>
+          </a:p>
+        </p:txBody>
+      </p:sp>
+      <p:sp>
+        <p:nvSpPr>
+          <p:cNvPr id="3" name="Content Placeholder 2"/>
           <p:cNvSpPr>
             <a:spLocks noGrp="1"/>
           </p:cNvSpPr>
@@ -2231,88 +1944,82 @@
         </p:nvSpPr>
         <p:spPr>
           <a:xfrm>
-            <a:off x="5183188" y="987425"/>
-            <a:ext cx="6172200" cy="4873625"/>
+            <a:off x="4545413" y="131657"/>
+            <a:ext cx="5412730" cy="649817"/>
           </a:xfrm>
         </p:spPr>
         <p:txBody>
           <a:bodyPr/>
           <a:lstStyle>
             <a:lvl1pPr>
-              <a:defRPr sz="3200"/>
+              <a:defRPr sz="427"/>
             </a:lvl1pPr>
             <a:lvl2pPr>
-              <a:defRPr sz="2800"/>
+              <a:defRPr sz="373"/>
             </a:lvl2pPr>
             <a:lvl3pPr>
-              <a:defRPr sz="2400"/>
+              <a:defRPr sz="320"/>
             </a:lvl3pPr>
             <a:lvl4pPr>
-              <a:defRPr sz="2000"/>
+              <a:defRPr sz="267"/>
             </a:lvl4pPr>
             <a:lvl5pPr>
-              <a:defRPr sz="2000"/>
+              <a:defRPr sz="267"/>
             </a:lvl5pPr>
             <a:lvl6pPr>
-              <a:defRPr sz="2000"/>
+              <a:defRPr sz="267"/>
             </a:lvl6pPr>
             <a:lvl7pPr>
-              <a:defRPr sz="2000"/>
+              <a:defRPr sz="267"/>
             </a:lvl7pPr>
             <a:lvl8pPr>
-              <a:defRPr sz="2000"/>
+              <a:defRPr sz="267"/>
             </a:lvl8pPr>
             <a:lvl9pPr>
-              <a:defRPr sz="2000"/>
+              <a:defRPr sz="267"/>
             </a:lvl9pPr>
           </a:lstStyle>
           <a:p>
             <a:pPr lvl="0"/>
             <a:r>
-              <a:rPr lang="en-US"/>
-              <a:t>Click to edit Master text styles</a:t>
+              <a:rPr lang="zh-CN" altLang="en-US"/>
+              <a:t>单击此处编辑母版文本样式</a:t>
             </a:r>
           </a:p>
           <a:p>
             <a:pPr lvl="1"/>
             <a:r>
-              <a:rPr lang="en-US"/>
-              <a:t>Second level</a:t>
+              <a:rPr lang="zh-CN" altLang="en-US"/>
+              <a:t>二级</a:t>
             </a:r>
           </a:p>
           <a:p>
             <a:pPr lvl="2"/>
             <a:r>
-              <a:rPr lang="en-US"/>
-              <a:t>Third level</a:t>
+              <a:rPr lang="zh-CN" altLang="en-US"/>
+              <a:t>三级</a:t>
             </a:r>
           </a:p>
           <a:p>
             <a:pPr lvl="3"/>
             <a:r>
-              <a:rPr lang="en-US"/>
-              <a:t>Fourth level</a:t>
+              <a:rPr lang="zh-CN" altLang="en-US"/>
+              <a:t>四级</a:t>
             </a:r>
           </a:p>
           <a:p>
             <a:pPr lvl="4"/>
             <a:r>
-              <a:rPr lang="en-US"/>
-              <a:t>Fifth level</a:t>
-            </a:r>
-            <a:endParaRPr lang="LID4096"/>
-          </a:p>
-        </p:txBody>
-      </p:sp>
-      <p:sp>
-        <p:nvSpPr>
-          <p:cNvPr id="4" name="Text Placeholder 3">
-            <a:extLst>
-              <a:ext uri="{FF2B5EF4-FFF2-40B4-BE49-F238E27FC236}">
-                <a16:creationId xmlns:a16="http://schemas.microsoft.com/office/drawing/2014/main" id="{ADB6B31E-567C-73FB-3451-2C6BF87A17AC}"/>
-              </a:ext>
-            </a:extLst>
-          </p:cNvPr>
+              <a:rPr lang="zh-CN" altLang="en-US"/>
+              <a:t>五级</a:t>
+            </a:r>
+            <a:endParaRPr lang="en-US" dirty="0"/>
+          </a:p>
+        </p:txBody>
+      </p:sp>
+      <p:sp>
+        <p:nvSpPr>
+          <p:cNvPr id="4" name="Text Placeholder 3"/>
           <p:cNvSpPr>
             <a:spLocks noGrp="1"/>
           </p:cNvSpPr>
@@ -2322,8 +2029,8 @@
         </p:nvSpPr>
         <p:spPr>
           <a:xfrm>
-            <a:off x="839788" y="2057400"/>
-            <a:ext cx="3932237" cy="3811588"/>
+            <a:off x="736455" y="274320"/>
+            <a:ext cx="3448388" cy="508212"/>
           </a:xfrm>
         </p:spPr>
         <p:txBody>
@@ -2331,59 +2038,53 @@
           <a:lstStyle>
             <a:lvl1pPr marL="0" indent="0">
               <a:buNone/>
-              <a:defRPr sz="1600"/>
+              <a:defRPr sz="213"/>
             </a:lvl1pPr>
-            <a:lvl2pPr marL="457200" indent="0">
-              <a:buNone/>
-              <a:defRPr sz="1400"/>
+            <a:lvl2pPr marL="60945" indent="0">
+              <a:buNone/>
+              <a:defRPr sz="187"/>
             </a:lvl2pPr>
-            <a:lvl3pPr marL="914400" indent="0">
-              <a:buNone/>
-              <a:defRPr sz="1200"/>
+            <a:lvl3pPr marL="121890" indent="0">
+              <a:buNone/>
+              <a:defRPr sz="160"/>
             </a:lvl3pPr>
-            <a:lvl4pPr marL="1371600" indent="0">
-              <a:buNone/>
-              <a:defRPr sz="1000"/>
+            <a:lvl4pPr marL="182834" indent="0">
+              <a:buNone/>
+              <a:defRPr sz="133"/>
             </a:lvl4pPr>
-            <a:lvl5pPr marL="1828800" indent="0">
-              <a:buNone/>
-              <a:defRPr sz="1000"/>
+            <a:lvl5pPr marL="243779" indent="0">
+              <a:buNone/>
+              <a:defRPr sz="133"/>
             </a:lvl5pPr>
-            <a:lvl6pPr marL="2286000" indent="0">
-              <a:buNone/>
-              <a:defRPr sz="1000"/>
+            <a:lvl6pPr marL="304724" indent="0">
+              <a:buNone/>
+              <a:defRPr sz="133"/>
             </a:lvl6pPr>
-            <a:lvl7pPr marL="2743200" indent="0">
-              <a:buNone/>
-              <a:defRPr sz="1000"/>
+            <a:lvl7pPr marL="365669" indent="0">
+              <a:buNone/>
+              <a:defRPr sz="133"/>
             </a:lvl7pPr>
-            <a:lvl8pPr marL="3200400" indent="0">
-              <a:buNone/>
-              <a:defRPr sz="1000"/>
+            <a:lvl8pPr marL="426613" indent="0">
+              <a:buNone/>
+              <a:defRPr sz="133"/>
             </a:lvl8pPr>
-            <a:lvl9pPr marL="3657600" indent="0">
-              <a:buNone/>
-              <a:defRPr sz="1000"/>
+            <a:lvl9pPr marL="487558" indent="0">
+              <a:buNone/>
+              <a:defRPr sz="133"/>
             </a:lvl9pPr>
           </a:lstStyle>
           <a:p>
             <a:pPr lvl="0"/>
             <a:r>
-              <a:rPr lang="en-US"/>
-              <a:t>Click to edit Master text styles</a:t>
-            </a:r>
-          </a:p>
-        </p:txBody>
-      </p:sp>
-      <p:sp>
-        <p:nvSpPr>
-          <p:cNvPr id="5" name="Date Placeholder 4">
-            <a:extLst>
-              <a:ext uri="{FF2B5EF4-FFF2-40B4-BE49-F238E27FC236}">
-                <a16:creationId xmlns:a16="http://schemas.microsoft.com/office/drawing/2014/main" id="{AEC74CD5-EE92-37B9-4B49-3619D131A0F3}"/>
-              </a:ext>
-            </a:extLst>
-          </p:cNvPr>
+              <a:rPr lang="zh-CN" altLang="en-US"/>
+              <a:t>单击此处编辑母版文本样式</a:t>
+            </a:r>
+          </a:p>
+        </p:txBody>
+      </p:sp>
+      <p:sp>
+        <p:nvSpPr>
+          <p:cNvPr id="5" name="Date Placeholder 4"/>
           <p:cNvSpPr>
             <a:spLocks noGrp="1"/>
           </p:cNvSpPr>
@@ -2398,7 +2099,7 @@
           <a:p>
             <a:fld id="{F06130A7-DCD0-4467-8EE9-D424F9B7AB0B}" type="datetimeFigureOut">
               <a:rPr lang="LID4096" smtClean="0"/>
-              <a:t>09/09/2024</a:t>
+              <a:t>07/27/2025</a:t>
             </a:fld>
             <a:endParaRPr lang="LID4096"/>
           </a:p>
@@ -2406,13 +2107,7 @@
       </p:sp>
       <p:sp>
         <p:nvSpPr>
-          <p:cNvPr id="6" name="Footer Placeholder 5">
-            <a:extLst>
-              <a:ext uri="{FF2B5EF4-FFF2-40B4-BE49-F238E27FC236}">
-                <a16:creationId xmlns:a16="http://schemas.microsoft.com/office/drawing/2014/main" id="{A7680A2B-611A-6B62-273B-F5DD0CDC8A4F}"/>
-              </a:ext>
-            </a:extLst>
-          </p:cNvPr>
+          <p:cNvPr id="6" name="Footer Placeholder 5"/>
           <p:cNvSpPr>
             <a:spLocks noGrp="1"/>
           </p:cNvSpPr>
@@ -2431,13 +2126,7 @@
       </p:sp>
       <p:sp>
         <p:nvSpPr>
-          <p:cNvPr id="7" name="Slide Number Placeholder 6">
-            <a:extLst>
-              <a:ext uri="{FF2B5EF4-FFF2-40B4-BE49-F238E27FC236}">
-                <a16:creationId xmlns:a16="http://schemas.microsoft.com/office/drawing/2014/main" id="{CA832AEE-6B08-D836-85FA-F256BCF14DA5}"/>
-              </a:ext>
-            </a:extLst>
-          </p:cNvPr>
+          <p:cNvPr id="7" name="Slide Number Placeholder 6"/>
           <p:cNvSpPr>
             <a:spLocks noGrp="1"/>
           </p:cNvSpPr>
@@ -2461,7 +2150,7 @@
     </p:spTree>
     <p:extLst>
       <p:ext uri="{BB962C8B-B14F-4D97-AF65-F5344CB8AC3E}">
-        <p14:creationId xmlns:p14="http://schemas.microsoft.com/office/powerpoint/2010/main" val="3660562992"/>
+        <p14:creationId xmlns:p14="http://schemas.microsoft.com/office/powerpoint/2010/main" val="3324272864"/>
       </p:ext>
     </p:extLst>
   </p:cSld>
@@ -2473,7 +2162,7 @@
 
 <file path=ppt/slideLayouts/slideLayout9.xml><?xml version="1.0" encoding="utf-8"?>
 <p:sldLayout xmlns:a="http://schemas.openxmlformats.org/drawingml/2006/main" xmlns:r="http://schemas.openxmlformats.org/officeDocument/2006/relationships" xmlns:p="http://schemas.openxmlformats.org/presentationml/2006/main" type="picTx" preserve="1">
-  <p:cSld name="Picture with Caption">
+  <p:cSld name="图片与标题">
     <p:spTree>
       <p:nvGrpSpPr>
         <p:cNvPr id="1" name=""/>
@@ -2490,13 +2179,7 @@
       </p:grpSpPr>
       <p:sp>
         <p:nvSpPr>
-          <p:cNvPr id="2" name="Title 1">
-            <a:extLst>
-              <a:ext uri="{FF2B5EF4-FFF2-40B4-BE49-F238E27FC236}">
-                <a16:creationId xmlns:a16="http://schemas.microsoft.com/office/drawing/2014/main" id="{AB0A8CA0-C497-27EF-26AD-35F3CF0D18DF}"/>
-              </a:ext>
-            </a:extLst>
-          </p:cNvPr>
+          <p:cNvPr id="2" name="Title 1"/>
           <p:cNvSpPr>
             <a:spLocks noGrp="1"/>
           </p:cNvSpPr>
@@ -2506,37 +2189,31 @@
         </p:nvSpPr>
         <p:spPr>
           <a:xfrm>
-            <a:off x="839788" y="457200"/>
-            <a:ext cx="3932237" cy="1600200"/>
+            <a:off x="736455" y="60960"/>
+            <a:ext cx="3448388" cy="213360"/>
           </a:xfrm>
         </p:spPr>
         <p:txBody>
           <a:bodyPr anchor="b"/>
           <a:lstStyle>
             <a:lvl1pPr>
-              <a:defRPr sz="3200"/>
+              <a:defRPr sz="427"/>
             </a:lvl1pPr>
           </a:lstStyle>
           <a:p>
             <a:r>
-              <a:rPr lang="en-US"/>
-              <a:t>Click to edit Master title style</a:t>
-            </a:r>
-            <a:endParaRPr lang="LID4096"/>
-          </a:p>
-        </p:txBody>
-      </p:sp>
-      <p:sp>
-        <p:nvSpPr>
-          <p:cNvPr id="3" name="Picture Placeholder 2">
-            <a:extLst>
-              <a:ext uri="{FF2B5EF4-FFF2-40B4-BE49-F238E27FC236}">
-                <a16:creationId xmlns:a16="http://schemas.microsoft.com/office/drawing/2014/main" id="{59B1189C-5DA5-A649-6509-7488EA80D12F}"/>
-              </a:ext>
-            </a:extLst>
-          </p:cNvPr>
-          <p:cNvSpPr>
-            <a:spLocks noGrp="1"/>
+              <a:rPr lang="zh-CN" altLang="en-US"/>
+              <a:t>单击此处编辑母版标题样式</a:t>
+            </a:r>
+            <a:endParaRPr lang="en-US" dirty="0"/>
+          </a:p>
+        </p:txBody>
+      </p:sp>
+      <p:sp>
+        <p:nvSpPr>
+          <p:cNvPr id="3" name="Picture Placeholder 2"/>
+          <p:cNvSpPr>
+            <a:spLocks noGrp="1" noChangeAspect="1"/>
           </p:cNvSpPr>
           <p:nvPr>
             <p:ph type="pic" idx="1"/>
@@ -2544,64 +2221,62 @@
         </p:nvSpPr>
         <p:spPr>
           <a:xfrm>
-            <a:off x="5183188" y="987425"/>
-            <a:ext cx="6172200" cy="4873625"/>
+            <a:off x="4545413" y="131657"/>
+            <a:ext cx="5412730" cy="649817"/>
           </a:xfrm>
         </p:spPr>
         <p:txBody>
-          <a:bodyPr/>
+          <a:bodyPr anchor="t"/>
           <a:lstStyle>
             <a:lvl1pPr marL="0" indent="0">
               <a:buNone/>
-              <a:defRPr sz="3200"/>
+              <a:defRPr sz="427"/>
             </a:lvl1pPr>
-            <a:lvl2pPr marL="457200" indent="0">
-              <a:buNone/>
-              <a:defRPr sz="2800"/>
+            <a:lvl2pPr marL="60945" indent="0">
+              <a:buNone/>
+              <a:defRPr sz="373"/>
             </a:lvl2pPr>
-            <a:lvl3pPr marL="914400" indent="0">
-              <a:buNone/>
-              <a:defRPr sz="2400"/>
+            <a:lvl3pPr marL="121890" indent="0">
+              <a:buNone/>
+              <a:defRPr sz="320"/>
             </a:lvl3pPr>
-            <a:lvl4pPr marL="1371600" indent="0">
-              <a:buNone/>
-              <a:defRPr sz="2000"/>
+            <a:lvl4pPr marL="182834" indent="0">
+              <a:buNone/>
+              <a:defRPr sz="267"/>
             </a:lvl4pPr>
-            <a:lvl5pPr marL="1828800" indent="0">
-              <a:buNone/>
-              <a:defRPr sz="2000"/>
+            <a:lvl5pPr marL="243779" indent="0">
+              <a:buNone/>
+              <a:defRPr sz="267"/>
             </a:lvl5pPr>
-            <a:lvl6pPr marL="2286000" indent="0">
-              <a:buNone/>
-              <a:defRPr sz="2000"/>
+            <a:lvl6pPr marL="304724" indent="0">
+              <a:buNone/>
+              <a:defRPr sz="267"/>
             </a:lvl6pPr>
-            <a:lvl7pPr marL="2743200" indent="0">
-              <a:buNone/>
-              <a:defRPr sz="2000"/>
+            <a:lvl7pPr marL="365669" indent="0">
+              <a:buNone/>
+              <a:defRPr sz="267"/>
             </a:lvl7pPr>
-            <a:lvl8pPr marL="3200400" indent="0">
-              <a:buNone/>
-              <a:defRPr sz="2000"/>
+            <a:lvl8pPr marL="426613" indent="0">
+              <a:buNone/>
+              <a:defRPr sz="267"/>
             </a:lvl8pPr>
-            <a:lvl9pPr marL="3657600" indent="0">
-              <a:buNone/>
-              <a:defRPr sz="2000"/>
+            <a:lvl9pPr marL="487558" indent="0">
+              <a:buNone/>
+              <a:defRPr sz="267"/>
             </a:lvl9pPr>
           </a:lstStyle>
           <a:p>
-            <a:endParaRPr lang="LID4096"/>
-          </a:p>
-        </p:txBody>
-      </p:sp>
-      <p:sp>
-        <p:nvSpPr>
-          <p:cNvPr id="4" name="Text Placeholder 3">
-            <a:extLst>
-              <a:ext uri="{FF2B5EF4-FFF2-40B4-BE49-F238E27FC236}">
-                <a16:creationId xmlns:a16="http://schemas.microsoft.com/office/drawing/2014/main" id="{DF056F88-3EF4-03CB-FCF3-E01614F7E378}"/>
-              </a:ext>
-            </a:extLst>
-          </p:cNvPr>
+            <a:r>
+              <a:rPr lang="zh-CN" altLang="en-US"/>
+              <a:t>单击图标添加图片</a:t>
+            </a:r>
+            <a:endParaRPr lang="en-US" dirty="0"/>
+          </a:p>
+        </p:txBody>
+      </p:sp>
+      <p:sp>
+        <p:nvSpPr>
+          <p:cNvPr id="4" name="Text Placeholder 3"/>
           <p:cNvSpPr>
             <a:spLocks noGrp="1"/>
           </p:cNvSpPr>
@@ -2611,8 +2286,8 @@
         </p:nvSpPr>
         <p:spPr>
           <a:xfrm>
-            <a:off x="839788" y="2057400"/>
-            <a:ext cx="3932237" cy="3811588"/>
+            <a:off x="736455" y="274320"/>
+            <a:ext cx="3448388" cy="508212"/>
           </a:xfrm>
         </p:spPr>
         <p:txBody>
@@ -2620,59 +2295,53 @@
           <a:lstStyle>
             <a:lvl1pPr marL="0" indent="0">
               <a:buNone/>
-              <a:defRPr sz="1600"/>
+              <a:defRPr sz="213"/>
             </a:lvl1pPr>
-            <a:lvl2pPr marL="457200" indent="0">
-              <a:buNone/>
-              <a:defRPr sz="1400"/>
+            <a:lvl2pPr marL="60945" indent="0">
+              <a:buNone/>
+              <a:defRPr sz="187"/>
             </a:lvl2pPr>
-            <a:lvl3pPr marL="914400" indent="0">
-              <a:buNone/>
-              <a:defRPr sz="1200"/>
+            <a:lvl3pPr marL="121890" indent="0">
+              <a:buNone/>
+              <a:defRPr sz="160"/>
             </a:lvl3pPr>
-            <a:lvl4pPr marL="1371600" indent="0">
-              <a:buNone/>
-              <a:defRPr sz="1000"/>
+            <a:lvl4pPr marL="182834" indent="0">
+              <a:buNone/>
+              <a:defRPr sz="133"/>
             </a:lvl4pPr>
-            <a:lvl5pPr marL="1828800" indent="0">
-              <a:buNone/>
-              <a:defRPr sz="1000"/>
+            <a:lvl5pPr marL="243779" indent="0">
+              <a:buNone/>
+              <a:defRPr sz="133"/>
             </a:lvl5pPr>
-            <a:lvl6pPr marL="2286000" indent="0">
-              <a:buNone/>
-              <a:defRPr sz="1000"/>
+            <a:lvl6pPr marL="304724" indent="0">
+              <a:buNone/>
+              <a:defRPr sz="133"/>
             </a:lvl6pPr>
-            <a:lvl7pPr marL="2743200" indent="0">
-              <a:buNone/>
-              <a:defRPr sz="1000"/>
+            <a:lvl7pPr marL="365669" indent="0">
+              <a:buNone/>
+              <a:defRPr sz="133"/>
             </a:lvl7pPr>
-            <a:lvl8pPr marL="3200400" indent="0">
-              <a:buNone/>
-              <a:defRPr sz="1000"/>
+            <a:lvl8pPr marL="426613" indent="0">
+              <a:buNone/>
+              <a:defRPr sz="133"/>
             </a:lvl8pPr>
-            <a:lvl9pPr marL="3657600" indent="0">
-              <a:buNone/>
-              <a:defRPr sz="1000"/>
+            <a:lvl9pPr marL="487558" indent="0">
+              <a:buNone/>
+              <a:defRPr sz="133"/>
             </a:lvl9pPr>
           </a:lstStyle>
           <a:p>
             <a:pPr lvl="0"/>
             <a:r>
-              <a:rPr lang="en-US"/>
-              <a:t>Click to edit Master text styles</a:t>
-            </a:r>
-          </a:p>
-        </p:txBody>
-      </p:sp>
-      <p:sp>
-        <p:nvSpPr>
-          <p:cNvPr id="5" name="Date Placeholder 4">
-            <a:extLst>
-              <a:ext uri="{FF2B5EF4-FFF2-40B4-BE49-F238E27FC236}">
-                <a16:creationId xmlns:a16="http://schemas.microsoft.com/office/drawing/2014/main" id="{078C8E3D-EBBC-A973-A921-B35F674118AE}"/>
-              </a:ext>
-            </a:extLst>
-          </p:cNvPr>
+              <a:rPr lang="zh-CN" altLang="en-US"/>
+              <a:t>单击此处编辑母版文本样式</a:t>
+            </a:r>
+          </a:p>
+        </p:txBody>
+      </p:sp>
+      <p:sp>
+        <p:nvSpPr>
+          <p:cNvPr id="5" name="Date Placeholder 4"/>
           <p:cNvSpPr>
             <a:spLocks noGrp="1"/>
           </p:cNvSpPr>
@@ -2687,7 +2356,7 @@
           <a:p>
             <a:fld id="{F06130A7-DCD0-4467-8EE9-D424F9B7AB0B}" type="datetimeFigureOut">
               <a:rPr lang="LID4096" smtClean="0"/>
-              <a:t>09/09/2024</a:t>
+              <a:t>07/27/2025</a:t>
             </a:fld>
             <a:endParaRPr lang="LID4096"/>
           </a:p>
@@ -2695,13 +2364,7 @@
       </p:sp>
       <p:sp>
         <p:nvSpPr>
-          <p:cNvPr id="6" name="Footer Placeholder 5">
-            <a:extLst>
-              <a:ext uri="{FF2B5EF4-FFF2-40B4-BE49-F238E27FC236}">
-                <a16:creationId xmlns:a16="http://schemas.microsoft.com/office/drawing/2014/main" id="{3D472B02-44DB-DF8A-8E4F-94F673D462A5}"/>
-              </a:ext>
-            </a:extLst>
-          </p:cNvPr>
+          <p:cNvPr id="6" name="Footer Placeholder 5"/>
           <p:cNvSpPr>
             <a:spLocks noGrp="1"/>
           </p:cNvSpPr>
@@ -2720,13 +2383,7 @@
       </p:sp>
       <p:sp>
         <p:nvSpPr>
-          <p:cNvPr id="7" name="Slide Number Placeholder 6">
-            <a:extLst>
-              <a:ext uri="{FF2B5EF4-FFF2-40B4-BE49-F238E27FC236}">
-                <a16:creationId xmlns:a16="http://schemas.microsoft.com/office/drawing/2014/main" id="{818F6C21-1C95-7302-1377-1062BA640AC0}"/>
-              </a:ext>
-            </a:extLst>
-          </p:cNvPr>
+          <p:cNvPr id="7" name="Slide Number Placeholder 6"/>
           <p:cNvSpPr>
             <a:spLocks noGrp="1"/>
           </p:cNvSpPr>
@@ -2750,7 +2407,7 @@
     </p:spTree>
     <p:extLst>
       <p:ext uri="{BB962C8B-B14F-4D97-AF65-F5344CB8AC3E}">
-        <p14:creationId xmlns:p14="http://schemas.microsoft.com/office/powerpoint/2010/main" val="1039554506"/>
+        <p14:creationId xmlns:p14="http://schemas.microsoft.com/office/powerpoint/2010/main" val="994769815"/>
       </p:ext>
     </p:extLst>
   </p:cSld>
@@ -2784,13 +2441,7 @@
       </p:grpSpPr>
       <p:sp>
         <p:nvSpPr>
-          <p:cNvPr id="2" name="Title Placeholder 1">
-            <a:extLst>
-              <a:ext uri="{FF2B5EF4-FFF2-40B4-BE49-F238E27FC236}">
-                <a16:creationId xmlns:a16="http://schemas.microsoft.com/office/drawing/2014/main" id="{39B69E12-BDA5-B818-CD40-44B23CD002F3}"/>
-              </a:ext>
-            </a:extLst>
-          </p:cNvPr>
+          <p:cNvPr id="2" name="Title Placeholder 1"/>
           <p:cNvSpPr>
             <a:spLocks noGrp="1"/>
           </p:cNvSpPr>
@@ -2800,8 +2451,8 @@
         </p:nvSpPr>
         <p:spPr>
           <a:xfrm>
-            <a:off x="838200" y="365125"/>
-            <a:ext cx="10515600" cy="1325563"/>
+            <a:off x="735062" y="48683"/>
+            <a:ext cx="9221689" cy="176742"/>
           </a:xfrm>
           <a:prstGeom prst="rect">
             <a:avLst/>
@@ -2814,22 +2465,16 @@
           <a:lstStyle/>
           <a:p>
             <a:r>
-              <a:rPr lang="en-US"/>
-              <a:t>Click to edit Master title style</a:t>
-            </a:r>
-            <a:endParaRPr lang="LID4096"/>
-          </a:p>
-        </p:txBody>
-      </p:sp>
-      <p:sp>
-        <p:nvSpPr>
-          <p:cNvPr id="3" name="Text Placeholder 2">
-            <a:extLst>
-              <a:ext uri="{FF2B5EF4-FFF2-40B4-BE49-F238E27FC236}">
-                <a16:creationId xmlns:a16="http://schemas.microsoft.com/office/drawing/2014/main" id="{5B375340-DB80-C94D-9216-09E08A43D9B5}"/>
-              </a:ext>
-            </a:extLst>
-          </p:cNvPr>
+              <a:rPr lang="zh-CN" altLang="en-US"/>
+              <a:t>单击此处编辑母版标题样式</a:t>
+            </a:r>
+            <a:endParaRPr lang="en-US" dirty="0"/>
+          </a:p>
+        </p:txBody>
+      </p:sp>
+      <p:sp>
+        <p:nvSpPr>
+          <p:cNvPr id="3" name="Text Placeholder 2"/>
           <p:cNvSpPr>
             <a:spLocks noGrp="1"/>
           </p:cNvSpPr>
@@ -2839,8 +2484,8 @@
         </p:nvSpPr>
         <p:spPr>
           <a:xfrm>
-            <a:off x="838200" y="1825625"/>
-            <a:ext cx="10515600" cy="4351338"/>
+            <a:off x="735062" y="243417"/>
+            <a:ext cx="9221689" cy="580178"/>
           </a:xfrm>
           <a:prstGeom prst="rect">
             <a:avLst/>
@@ -2854,50 +2499,44 @@
           <a:p>
             <a:pPr lvl="0"/>
             <a:r>
-              <a:rPr lang="en-US"/>
-              <a:t>Click to edit Master text styles</a:t>
+              <a:rPr lang="zh-CN" altLang="en-US"/>
+              <a:t>单击此处编辑母版文本样式</a:t>
             </a:r>
           </a:p>
           <a:p>
             <a:pPr lvl="1"/>
             <a:r>
-              <a:rPr lang="en-US"/>
-              <a:t>Second level</a:t>
+              <a:rPr lang="zh-CN" altLang="en-US"/>
+              <a:t>二级</a:t>
             </a:r>
           </a:p>
           <a:p>
             <a:pPr lvl="2"/>
             <a:r>
-              <a:rPr lang="en-US"/>
-              <a:t>Third level</a:t>
+              <a:rPr lang="zh-CN" altLang="en-US"/>
+              <a:t>三级</a:t>
             </a:r>
           </a:p>
           <a:p>
             <a:pPr lvl="3"/>
             <a:r>
-              <a:rPr lang="en-US"/>
-              <a:t>Fourth level</a:t>
+              <a:rPr lang="zh-CN" altLang="en-US"/>
+              <a:t>四级</a:t>
             </a:r>
           </a:p>
           <a:p>
             <a:pPr lvl="4"/>
             <a:r>
-              <a:rPr lang="en-US"/>
-              <a:t>Fifth level</a:t>
-            </a:r>
-            <a:endParaRPr lang="LID4096"/>
-          </a:p>
-        </p:txBody>
-      </p:sp>
-      <p:sp>
-        <p:nvSpPr>
-          <p:cNvPr id="4" name="Date Placeholder 3">
-            <a:extLst>
-              <a:ext uri="{FF2B5EF4-FFF2-40B4-BE49-F238E27FC236}">
-                <a16:creationId xmlns:a16="http://schemas.microsoft.com/office/drawing/2014/main" id="{FF0CBA1A-CB0C-5AC3-F469-D65C9A4D099F}"/>
-              </a:ext>
-            </a:extLst>
-          </p:cNvPr>
+              <a:rPr lang="zh-CN" altLang="en-US"/>
+              <a:t>五级</a:t>
+            </a:r>
+            <a:endParaRPr lang="en-US" dirty="0"/>
+          </a:p>
+        </p:txBody>
+      </p:sp>
+      <p:sp>
+        <p:nvSpPr>
+          <p:cNvPr id="4" name="Date Placeholder 3"/>
           <p:cNvSpPr>
             <a:spLocks noGrp="1"/>
           </p:cNvSpPr>
@@ -2907,8 +2546,8 @@
         </p:nvSpPr>
         <p:spPr>
           <a:xfrm>
-            <a:off x="838200" y="6356350"/>
-            <a:ext cx="2743200" cy="365125"/>
+            <a:off x="735062" y="847514"/>
+            <a:ext cx="2405658" cy="48683"/>
           </a:xfrm>
           <a:prstGeom prst="rect">
             <a:avLst/>
@@ -2918,7 +2557,7 @@
           <a:bodyPr vert="horz" lIns="91440" tIns="45720" rIns="91440" bIns="45720" rtlCol="0" anchor="ctr"/>
           <a:lstStyle>
             <a:lvl1pPr algn="l">
-              <a:defRPr sz="1200">
+              <a:defRPr sz="160">
                 <a:solidFill>
                   <a:schemeClr val="tx1">
                     <a:tint val="82000"/>
@@ -2930,7 +2569,7 @@
           <a:p>
             <a:fld id="{F06130A7-DCD0-4467-8EE9-D424F9B7AB0B}" type="datetimeFigureOut">
               <a:rPr lang="LID4096" smtClean="0"/>
-              <a:t>09/09/2024</a:t>
+              <a:t>07/27/2025</a:t>
             </a:fld>
             <a:endParaRPr lang="LID4096"/>
           </a:p>
@@ -2938,13 +2577,7 @@
       </p:sp>
       <p:sp>
         <p:nvSpPr>
-          <p:cNvPr id="5" name="Footer Placeholder 4">
-            <a:extLst>
-              <a:ext uri="{FF2B5EF4-FFF2-40B4-BE49-F238E27FC236}">
-                <a16:creationId xmlns:a16="http://schemas.microsoft.com/office/drawing/2014/main" id="{CA1A3701-0D0C-ACD2-BB33-21E404E48AF6}"/>
-              </a:ext>
-            </a:extLst>
-          </p:cNvPr>
+          <p:cNvPr id="5" name="Footer Placeholder 4"/>
           <p:cNvSpPr>
             <a:spLocks noGrp="1"/>
           </p:cNvSpPr>
@@ -2954,8 +2587,8 @@
         </p:nvSpPr>
         <p:spPr>
           <a:xfrm>
-            <a:off x="4038600" y="6356350"/>
-            <a:ext cx="4114800" cy="365125"/>
+            <a:off x="3541663" y="847514"/>
+            <a:ext cx="3608487" cy="48683"/>
           </a:xfrm>
           <a:prstGeom prst="rect">
             <a:avLst/>
@@ -2965,7 +2598,7 @@
           <a:bodyPr vert="horz" lIns="91440" tIns="45720" rIns="91440" bIns="45720" rtlCol="0" anchor="ctr"/>
           <a:lstStyle>
             <a:lvl1pPr algn="ctr">
-              <a:defRPr sz="1200">
+              <a:defRPr sz="160">
                 <a:solidFill>
                   <a:schemeClr val="tx1">
                     <a:tint val="82000"/>
@@ -2981,13 +2614,7 @@
       </p:sp>
       <p:sp>
         <p:nvSpPr>
-          <p:cNvPr id="6" name="Slide Number Placeholder 5">
-            <a:extLst>
-              <a:ext uri="{FF2B5EF4-FFF2-40B4-BE49-F238E27FC236}">
-                <a16:creationId xmlns:a16="http://schemas.microsoft.com/office/drawing/2014/main" id="{9AF1F1A4-EE4C-1F27-44D9-8B4376F9695B}"/>
-              </a:ext>
-            </a:extLst>
-          </p:cNvPr>
+          <p:cNvPr id="6" name="Slide Number Placeholder 5"/>
           <p:cNvSpPr>
             <a:spLocks noGrp="1"/>
           </p:cNvSpPr>
@@ -2997,8 +2624,8 @@
         </p:nvSpPr>
         <p:spPr>
           <a:xfrm>
-            <a:off x="8610600" y="6356350"/>
-            <a:ext cx="2743200" cy="365125"/>
+            <a:off x="7551093" y="847514"/>
+            <a:ext cx="2405658" cy="48683"/>
           </a:xfrm>
           <a:prstGeom prst="rect">
             <a:avLst/>
@@ -3008,7 +2635,7 @@
           <a:bodyPr vert="horz" lIns="91440" tIns="45720" rIns="91440" bIns="45720" rtlCol="0" anchor="ctr"/>
           <a:lstStyle>
             <a:lvl1pPr algn="r">
-              <a:defRPr sz="1200">
+              <a:defRPr sz="160">
                 <a:solidFill>
                   <a:schemeClr val="tx1">
                     <a:tint val="82000"/>
@@ -3029,27 +2656,27 @@
     </p:spTree>
     <p:extLst>
       <p:ext uri="{BB962C8B-B14F-4D97-AF65-F5344CB8AC3E}">
-        <p14:creationId xmlns:p14="http://schemas.microsoft.com/office/powerpoint/2010/main" val="3018913886"/>
+        <p14:creationId xmlns:p14="http://schemas.microsoft.com/office/powerpoint/2010/main" val="4184104257"/>
       </p:ext>
     </p:extLst>
   </p:cSld>
   <p:clrMap bg1="lt1" tx1="dk1" bg2="lt2" tx2="dk2" accent1="accent1" accent2="accent2" accent3="accent3" accent4="accent4" accent5="accent5" accent6="accent6" hlink="hlink" folHlink="folHlink"/>
   <p:sldLayoutIdLst>
-    <p:sldLayoutId id="2147483649" r:id="rId1"/>
-    <p:sldLayoutId id="2147483650" r:id="rId2"/>
-    <p:sldLayoutId id="2147483651" r:id="rId3"/>
-    <p:sldLayoutId id="2147483652" r:id="rId4"/>
-    <p:sldLayoutId id="2147483653" r:id="rId5"/>
-    <p:sldLayoutId id="2147483654" r:id="rId6"/>
-    <p:sldLayoutId id="2147483655" r:id="rId7"/>
-    <p:sldLayoutId id="2147483656" r:id="rId8"/>
-    <p:sldLayoutId id="2147483657" r:id="rId9"/>
-    <p:sldLayoutId id="2147483658" r:id="rId10"/>
-    <p:sldLayoutId id="2147483659" r:id="rId11"/>
+    <p:sldLayoutId id="2147483673" r:id="rId1"/>
+    <p:sldLayoutId id="2147483674" r:id="rId2"/>
+    <p:sldLayoutId id="2147483675" r:id="rId3"/>
+    <p:sldLayoutId id="2147483676" r:id="rId4"/>
+    <p:sldLayoutId id="2147483677" r:id="rId5"/>
+    <p:sldLayoutId id="2147483678" r:id="rId6"/>
+    <p:sldLayoutId id="2147483679" r:id="rId7"/>
+    <p:sldLayoutId id="2147483680" r:id="rId8"/>
+    <p:sldLayoutId id="2147483681" r:id="rId9"/>
+    <p:sldLayoutId id="2147483682" r:id="rId10"/>
+    <p:sldLayoutId id="2147483683" r:id="rId11"/>
   </p:sldLayoutIdLst>
   <p:txStyles>
     <p:titleStyle>
-      <a:lvl1pPr algn="l" defTabSz="914400" rtl="0" eaLnBrk="1" latinLnBrk="0" hangingPunct="1">
+      <a:lvl1pPr algn="l" defTabSz="121890" rtl="0" eaLnBrk="1" latinLnBrk="0" hangingPunct="1">
         <a:lnSpc>
           <a:spcPct val="90000"/>
         </a:lnSpc>
@@ -3057,7 +2684,7 @@
           <a:spcPct val="0"/>
         </a:spcBef>
         <a:buNone/>
-        <a:defRPr sz="4400" kern="1200">
+        <a:defRPr sz="587" kern="1200">
           <a:solidFill>
             <a:schemeClr val="tx1"/>
           </a:solidFill>
@@ -3068,16 +2695,16 @@
       </a:lvl1pPr>
     </p:titleStyle>
     <p:bodyStyle>
-      <a:lvl1pPr marL="228600" indent="-228600" algn="l" defTabSz="914400" rtl="0" eaLnBrk="1" latinLnBrk="0" hangingPunct="1">
+      <a:lvl1pPr marL="30472" indent="-30472" algn="l" defTabSz="121890" rtl="0" eaLnBrk="1" latinLnBrk="0" hangingPunct="1">
         <a:lnSpc>
           <a:spcPct val="90000"/>
         </a:lnSpc>
         <a:spcBef>
-          <a:spcPts val="1000"/>
+          <a:spcPts val="133"/>
         </a:spcBef>
         <a:buFont typeface="Arial" panose="020B0604020202020204" pitchFamily="34" charset="0"/>
         <a:buChar char="•"/>
-        <a:defRPr sz="2800" kern="1200">
+        <a:defRPr sz="373" kern="1200">
           <a:solidFill>
             <a:schemeClr val="tx1"/>
           </a:solidFill>
@@ -3086,16 +2713,16 @@
           <a:cs typeface="+mn-cs"/>
         </a:defRPr>
       </a:lvl1pPr>
-      <a:lvl2pPr marL="685800" indent="-228600" algn="l" defTabSz="914400" rtl="0" eaLnBrk="1" latinLnBrk="0" hangingPunct="1">
+      <a:lvl2pPr marL="91417" indent="-30472" algn="l" defTabSz="121890" rtl="0" eaLnBrk="1" latinLnBrk="0" hangingPunct="1">
         <a:lnSpc>
           <a:spcPct val="90000"/>
         </a:lnSpc>
         <a:spcBef>
-          <a:spcPts val="500"/>
+          <a:spcPts val="67"/>
         </a:spcBef>
         <a:buFont typeface="Arial" panose="020B0604020202020204" pitchFamily="34" charset="0"/>
         <a:buChar char="•"/>
-        <a:defRPr sz="2400" kern="1200">
+        <a:defRPr sz="320" kern="1200">
           <a:solidFill>
             <a:schemeClr val="tx1"/>
           </a:solidFill>
@@ -3104,16 +2731,16 @@
           <a:cs typeface="+mn-cs"/>
         </a:defRPr>
       </a:lvl2pPr>
-      <a:lvl3pPr marL="1143000" indent="-228600" algn="l" defTabSz="914400" rtl="0" eaLnBrk="1" latinLnBrk="0" hangingPunct="1">
+      <a:lvl3pPr marL="152362" indent="-30472" algn="l" defTabSz="121890" rtl="0" eaLnBrk="1" latinLnBrk="0" hangingPunct="1">
         <a:lnSpc>
           <a:spcPct val="90000"/>
         </a:lnSpc>
         <a:spcBef>
-          <a:spcPts val="500"/>
+          <a:spcPts val="67"/>
         </a:spcBef>
         <a:buFont typeface="Arial" panose="020B0604020202020204" pitchFamily="34" charset="0"/>
         <a:buChar char="•"/>
-        <a:defRPr sz="2000" kern="1200">
+        <a:defRPr sz="267" kern="1200">
           <a:solidFill>
             <a:schemeClr val="tx1"/>
           </a:solidFill>
@@ -3122,16 +2749,16 @@
           <a:cs typeface="+mn-cs"/>
         </a:defRPr>
       </a:lvl3pPr>
-      <a:lvl4pPr marL="1600200" indent="-228600" algn="l" defTabSz="914400" rtl="0" eaLnBrk="1" latinLnBrk="0" hangingPunct="1">
+      <a:lvl4pPr marL="213307" indent="-30472" algn="l" defTabSz="121890" rtl="0" eaLnBrk="1" latinLnBrk="0" hangingPunct="1">
         <a:lnSpc>
           <a:spcPct val="90000"/>
         </a:lnSpc>
         <a:spcBef>
-          <a:spcPts val="500"/>
+          <a:spcPts val="67"/>
         </a:spcBef>
         <a:buFont typeface="Arial" panose="020B0604020202020204" pitchFamily="34" charset="0"/>
         <a:buChar char="•"/>
-        <a:defRPr sz="1800" kern="1200">
+        <a:defRPr sz="240" kern="1200">
           <a:solidFill>
             <a:schemeClr val="tx1"/>
           </a:solidFill>
@@ -3140,16 +2767,16 @@
           <a:cs typeface="+mn-cs"/>
         </a:defRPr>
       </a:lvl4pPr>
-      <a:lvl5pPr marL="2057400" indent="-228600" algn="l" defTabSz="914400" rtl="0" eaLnBrk="1" latinLnBrk="0" hangingPunct="1">
+      <a:lvl5pPr marL="274251" indent="-30472" algn="l" defTabSz="121890" rtl="0" eaLnBrk="1" latinLnBrk="0" hangingPunct="1">
         <a:lnSpc>
           <a:spcPct val="90000"/>
         </a:lnSpc>
         <a:spcBef>
-          <a:spcPts val="500"/>
+          <a:spcPts val="67"/>
         </a:spcBef>
         <a:buFont typeface="Arial" panose="020B0604020202020204" pitchFamily="34" charset="0"/>
         <a:buChar char="•"/>
-        <a:defRPr sz="1800" kern="1200">
+        <a:defRPr sz="240" kern="1200">
           <a:solidFill>
             <a:schemeClr val="tx1"/>
           </a:solidFill>
@@ -3158,16 +2785,16 @@
           <a:cs typeface="+mn-cs"/>
         </a:defRPr>
       </a:lvl5pPr>
-      <a:lvl6pPr marL="2514600" indent="-228600" algn="l" defTabSz="914400" rtl="0" eaLnBrk="1" latinLnBrk="0" hangingPunct="1">
+      <a:lvl6pPr marL="335196" indent="-30472" algn="l" defTabSz="121890" rtl="0" eaLnBrk="1" latinLnBrk="0" hangingPunct="1">
         <a:lnSpc>
           <a:spcPct val="90000"/>
         </a:lnSpc>
         <a:spcBef>
-          <a:spcPts val="500"/>
+          <a:spcPts val="67"/>
         </a:spcBef>
         <a:buFont typeface="Arial" panose="020B0604020202020204" pitchFamily="34" charset="0"/>
         <a:buChar char="•"/>
-        <a:defRPr sz="1800" kern="1200">
+        <a:defRPr sz="240" kern="1200">
           <a:solidFill>
             <a:schemeClr val="tx1"/>
           </a:solidFill>
@@ -3176,16 +2803,16 @@
           <a:cs typeface="+mn-cs"/>
         </a:defRPr>
       </a:lvl6pPr>
-      <a:lvl7pPr marL="2971800" indent="-228600" algn="l" defTabSz="914400" rtl="0" eaLnBrk="1" latinLnBrk="0" hangingPunct="1">
+      <a:lvl7pPr marL="396141" indent="-30472" algn="l" defTabSz="121890" rtl="0" eaLnBrk="1" latinLnBrk="0" hangingPunct="1">
         <a:lnSpc>
           <a:spcPct val="90000"/>
         </a:lnSpc>
         <a:spcBef>
-          <a:spcPts val="500"/>
+          <a:spcPts val="67"/>
         </a:spcBef>
         <a:buFont typeface="Arial" panose="020B0604020202020204" pitchFamily="34" charset="0"/>
         <a:buChar char="•"/>
-        <a:defRPr sz="1800" kern="1200">
+        <a:defRPr sz="240" kern="1200">
           <a:solidFill>
             <a:schemeClr val="tx1"/>
           </a:solidFill>
@@ -3194,16 +2821,16 @@
           <a:cs typeface="+mn-cs"/>
         </a:defRPr>
       </a:lvl7pPr>
-      <a:lvl8pPr marL="3429000" indent="-228600" algn="l" defTabSz="914400" rtl="0" eaLnBrk="1" latinLnBrk="0" hangingPunct="1">
+      <a:lvl8pPr marL="457086" indent="-30472" algn="l" defTabSz="121890" rtl="0" eaLnBrk="1" latinLnBrk="0" hangingPunct="1">
         <a:lnSpc>
           <a:spcPct val="90000"/>
         </a:lnSpc>
         <a:spcBef>
-          <a:spcPts val="500"/>
+          <a:spcPts val="67"/>
         </a:spcBef>
         <a:buFont typeface="Arial" panose="020B0604020202020204" pitchFamily="34" charset="0"/>
         <a:buChar char="•"/>
-        <a:defRPr sz="1800" kern="1200">
+        <a:defRPr sz="240" kern="1200">
           <a:solidFill>
             <a:schemeClr val="tx1"/>
           </a:solidFill>
@@ -3212,16 +2839,16 @@
           <a:cs typeface="+mn-cs"/>
         </a:defRPr>
       </a:lvl8pPr>
-      <a:lvl9pPr marL="3886200" indent="-228600" algn="l" defTabSz="914400" rtl="0" eaLnBrk="1" latinLnBrk="0" hangingPunct="1">
+      <a:lvl9pPr marL="518030" indent="-30472" algn="l" defTabSz="121890" rtl="0" eaLnBrk="1" latinLnBrk="0" hangingPunct="1">
         <a:lnSpc>
           <a:spcPct val="90000"/>
         </a:lnSpc>
         <a:spcBef>
-          <a:spcPts val="500"/>
+          <a:spcPts val="67"/>
         </a:spcBef>
         <a:buFont typeface="Arial" panose="020B0604020202020204" pitchFamily="34" charset="0"/>
         <a:buChar char="•"/>
-        <a:defRPr sz="1800" kern="1200">
+        <a:defRPr sz="240" kern="1200">
           <a:solidFill>
             <a:schemeClr val="tx1"/>
           </a:solidFill>
@@ -3233,10 +2860,10 @@
     </p:bodyStyle>
     <p:otherStyle>
       <a:defPPr>
-        <a:defRPr lang="LID4096"/>
+        <a:defRPr lang="en-US"/>
       </a:defPPr>
-      <a:lvl1pPr marL="0" algn="l" defTabSz="914400" rtl="0" eaLnBrk="1" latinLnBrk="0" hangingPunct="1">
-        <a:defRPr sz="1800" kern="1200">
+      <a:lvl1pPr marL="0" algn="l" defTabSz="121890" rtl="0" eaLnBrk="1" latinLnBrk="0" hangingPunct="1">
+        <a:defRPr sz="240" kern="1200">
           <a:solidFill>
             <a:schemeClr val="tx1"/>
           </a:solidFill>
@@ -3245,8 +2872,8 @@
           <a:cs typeface="+mn-cs"/>
         </a:defRPr>
       </a:lvl1pPr>
-      <a:lvl2pPr marL="457200" algn="l" defTabSz="914400" rtl="0" eaLnBrk="1" latinLnBrk="0" hangingPunct="1">
-        <a:defRPr sz="1800" kern="1200">
+      <a:lvl2pPr marL="60945" algn="l" defTabSz="121890" rtl="0" eaLnBrk="1" latinLnBrk="0" hangingPunct="1">
+        <a:defRPr sz="240" kern="1200">
           <a:solidFill>
             <a:schemeClr val="tx1"/>
           </a:solidFill>
@@ -3255,8 +2882,8 @@
           <a:cs typeface="+mn-cs"/>
         </a:defRPr>
       </a:lvl2pPr>
-      <a:lvl3pPr marL="914400" algn="l" defTabSz="914400" rtl="0" eaLnBrk="1" latinLnBrk="0" hangingPunct="1">
-        <a:defRPr sz="1800" kern="1200">
+      <a:lvl3pPr marL="121890" algn="l" defTabSz="121890" rtl="0" eaLnBrk="1" latinLnBrk="0" hangingPunct="1">
+        <a:defRPr sz="240" kern="1200">
           <a:solidFill>
             <a:schemeClr val="tx1"/>
           </a:solidFill>
@@ -3265,8 +2892,8 @@
           <a:cs typeface="+mn-cs"/>
         </a:defRPr>
       </a:lvl3pPr>
-      <a:lvl4pPr marL="1371600" algn="l" defTabSz="914400" rtl="0" eaLnBrk="1" latinLnBrk="0" hangingPunct="1">
-        <a:defRPr sz="1800" kern="1200">
+      <a:lvl4pPr marL="182834" algn="l" defTabSz="121890" rtl="0" eaLnBrk="1" latinLnBrk="0" hangingPunct="1">
+        <a:defRPr sz="240" kern="1200">
           <a:solidFill>
             <a:schemeClr val="tx1"/>
           </a:solidFill>
@@ -3275,8 +2902,8 @@
           <a:cs typeface="+mn-cs"/>
         </a:defRPr>
       </a:lvl4pPr>
-      <a:lvl5pPr marL="1828800" algn="l" defTabSz="914400" rtl="0" eaLnBrk="1" latinLnBrk="0" hangingPunct="1">
-        <a:defRPr sz="1800" kern="1200">
+      <a:lvl5pPr marL="243779" algn="l" defTabSz="121890" rtl="0" eaLnBrk="1" latinLnBrk="0" hangingPunct="1">
+        <a:defRPr sz="240" kern="1200">
           <a:solidFill>
             <a:schemeClr val="tx1"/>
           </a:solidFill>
@@ -3285,8 +2912,8 @@
           <a:cs typeface="+mn-cs"/>
         </a:defRPr>
       </a:lvl5pPr>
-      <a:lvl6pPr marL="2286000" algn="l" defTabSz="914400" rtl="0" eaLnBrk="1" latinLnBrk="0" hangingPunct="1">
-        <a:defRPr sz="1800" kern="1200">
+      <a:lvl6pPr marL="304724" algn="l" defTabSz="121890" rtl="0" eaLnBrk="1" latinLnBrk="0" hangingPunct="1">
+        <a:defRPr sz="240" kern="1200">
           <a:solidFill>
             <a:schemeClr val="tx1"/>
           </a:solidFill>
@@ -3295,8 +2922,8 @@
           <a:cs typeface="+mn-cs"/>
         </a:defRPr>
       </a:lvl6pPr>
-      <a:lvl7pPr marL="2743200" algn="l" defTabSz="914400" rtl="0" eaLnBrk="1" latinLnBrk="0" hangingPunct="1">
-        <a:defRPr sz="1800" kern="1200">
+      <a:lvl7pPr marL="365669" algn="l" defTabSz="121890" rtl="0" eaLnBrk="1" latinLnBrk="0" hangingPunct="1">
+        <a:defRPr sz="240" kern="1200">
           <a:solidFill>
             <a:schemeClr val="tx1"/>
           </a:solidFill>
@@ -3305,8 +2932,8 @@
           <a:cs typeface="+mn-cs"/>
         </a:defRPr>
       </a:lvl7pPr>
-      <a:lvl8pPr marL="3200400" algn="l" defTabSz="914400" rtl="0" eaLnBrk="1" latinLnBrk="0" hangingPunct="1">
-        <a:defRPr sz="1800" kern="1200">
+      <a:lvl8pPr marL="426613" algn="l" defTabSz="121890" rtl="0" eaLnBrk="1" latinLnBrk="0" hangingPunct="1">
+        <a:defRPr sz="240" kern="1200">
           <a:solidFill>
             <a:schemeClr val="tx1"/>
           </a:solidFill>
@@ -3315,8 +2942,8 @@
           <a:cs typeface="+mn-cs"/>
         </a:defRPr>
       </a:lvl8pPr>
-      <a:lvl9pPr marL="3657600" algn="l" defTabSz="914400" rtl="0" eaLnBrk="1" latinLnBrk="0" hangingPunct="1">
-        <a:defRPr sz="1800" kern="1200">
+      <a:lvl9pPr marL="487558" algn="l" defTabSz="121890" rtl="0" eaLnBrk="1" latinLnBrk="0" hangingPunct="1">
+        <a:defRPr sz="240" kern="1200">
           <a:solidFill>
             <a:schemeClr val="tx1"/>
           </a:solidFill>
@@ -3369,7 +2996,7 @@
         </p:blipFill>
         <p:spPr>
           <a:xfrm>
-            <a:off x="203617" y="143636"/>
+            <a:off x="88525" y="18678"/>
             <a:ext cx="2332881" cy="679324"/>
           </a:xfrm>
           <a:prstGeom prst="rect">
@@ -3391,10 +3018,10 @@
         </p:nvGrpSpPr>
         <p:grpSpPr>
           <a:xfrm>
-            <a:off x="2801672" y="67799"/>
+            <a:off x="2686577" y="-57149"/>
             <a:ext cx="2903998" cy="830997"/>
             <a:chOff x="5076074" y="6065053"/>
-            <a:chExt cx="2561560" cy="733006"/>
+            <a:chExt cx="2561561" cy="733005"/>
           </a:xfrm>
         </p:grpSpPr>
         <p:sp>
@@ -3412,7 +3039,7 @@
           <p:spPr>
             <a:xfrm>
               <a:off x="5574358" y="6065053"/>
-              <a:ext cx="2063276" cy="733006"/>
+              <a:ext cx="2063277" cy="733005"/>
             </a:xfrm>
             <a:prstGeom prst="rect">
               <a:avLst/>
@@ -3518,7 +3145,7 @@
         </p:blipFill>
         <p:spPr>
           <a:xfrm>
-            <a:off x="6270566" y="161646"/>
+            <a:off x="6155472" y="36687"/>
             <a:ext cx="3906706" cy="713352"/>
           </a:xfrm>
           <a:prstGeom prst="rect">
@@ -3540,7 +3167,7 @@
         </p:nvCxnSpPr>
         <p:spPr>
           <a:xfrm>
-            <a:off x="5925312" y="143636"/>
+            <a:off x="5810218" y="18677"/>
             <a:ext cx="0" cy="596956"/>
           </a:xfrm>
           <a:prstGeom prst="line">
@@ -3580,10 +3207,188 @@
 </p:sld>
 </file>
 
+<file path=ppt/slides/slide2.xml><?xml version="1.0" encoding="utf-8"?>
+<p:sld xmlns:a="http://schemas.openxmlformats.org/drawingml/2006/main" xmlns:r="http://schemas.openxmlformats.org/officeDocument/2006/relationships" xmlns:p="http://schemas.openxmlformats.org/presentationml/2006/main">
+  <p:cSld>
+    <p:spTree>
+      <p:nvGrpSpPr>
+        <p:cNvPr id="1" name="">
+          <a:extLst>
+            <a:ext uri="{FF2B5EF4-FFF2-40B4-BE49-F238E27FC236}">
+              <a16:creationId xmlns:a16="http://schemas.microsoft.com/office/drawing/2014/main" id="{0CCABD39-FF31-654D-1EA3-4736EC256CFA}"/>
+            </a:ext>
+          </a:extLst>
+        </p:cNvPr>
+        <p:cNvGrpSpPr/>
+        <p:nvPr/>
+      </p:nvGrpSpPr>
+      <p:grpSpPr>
+        <a:xfrm>
+          <a:off x="0" y="0"/>
+          <a:ext cx="0" cy="0"/>
+          <a:chOff x="0" y="0"/>
+          <a:chExt cx="0" cy="0"/>
+        </a:xfrm>
+      </p:grpSpPr>
+      <p:pic>
+        <p:nvPicPr>
+          <p:cNvPr id="6" name="Picture 5">
+            <a:extLst>
+              <a:ext uri="{FF2B5EF4-FFF2-40B4-BE49-F238E27FC236}">
+                <a16:creationId xmlns:a16="http://schemas.microsoft.com/office/drawing/2014/main" id="{68275D94-AB86-393B-E70D-E1E2ED729038}"/>
+              </a:ext>
+            </a:extLst>
+          </p:cNvPr>
+          <p:cNvPicPr>
+            <a:picLocks noChangeAspect="1"/>
+          </p:cNvPicPr>
+          <p:nvPr/>
+        </p:nvPicPr>
+        <p:blipFill>
+          <a:blip r:embed="rId2"/>
+          <a:stretch>
+            <a:fillRect/>
+          </a:stretch>
+        </p:blipFill>
+        <p:spPr>
+          <a:xfrm>
+            <a:off x="88525" y="16637"/>
+            <a:ext cx="2332881" cy="679324"/>
+          </a:xfrm>
+          <a:prstGeom prst="rect">
+            <a:avLst/>
+          </a:prstGeom>
+        </p:spPr>
+      </p:pic>
+      <p:pic>
+        <p:nvPicPr>
+          <p:cNvPr id="10" name="图片 5">
+            <a:extLst>
+              <a:ext uri="{FF2B5EF4-FFF2-40B4-BE49-F238E27FC236}">
+                <a16:creationId xmlns:a16="http://schemas.microsoft.com/office/drawing/2014/main" id="{19DE8E9B-A7BD-0514-8168-10479D06D57E}"/>
+              </a:ext>
+            </a:extLst>
+          </p:cNvPr>
+          <p:cNvPicPr>
+            <a:picLocks noChangeAspect="1"/>
+          </p:cNvPicPr>
+          <p:nvPr/>
+        </p:nvPicPr>
+        <p:blipFill>
+          <a:blip r:embed="rId3">
+            <a:clrChange>
+              <a:clrFrom>
+                <a:srgbClr val="FFFFFF"/>
+              </a:clrFrom>
+              <a:clrTo>
+                <a:srgbClr val="FFFFFF">
+                  <a:alpha val="0"/>
+                </a:srgbClr>
+              </a:clrTo>
+            </a:clrChange>
+          </a:blip>
+          <a:stretch>
+            <a:fillRect/>
+          </a:stretch>
+        </p:blipFill>
+        <p:spPr>
+          <a:xfrm>
+            <a:off x="6155472" y="34646"/>
+            <a:ext cx="3906706" cy="713352"/>
+          </a:xfrm>
+          <a:prstGeom prst="rect">
+            <a:avLst/>
+          </a:prstGeom>
+        </p:spPr>
+      </p:pic>
+      <p:cxnSp>
+        <p:nvCxnSpPr>
+          <p:cNvPr id="3" name="Straight Connector 2">
+            <a:extLst>
+              <a:ext uri="{FF2B5EF4-FFF2-40B4-BE49-F238E27FC236}">
+                <a16:creationId xmlns:a16="http://schemas.microsoft.com/office/drawing/2014/main" id="{16D8FD95-FF5B-CEC7-12D4-F47D8C6116FF}"/>
+              </a:ext>
+            </a:extLst>
+          </p:cNvPr>
+          <p:cNvCxnSpPr/>
+          <p:nvPr/>
+        </p:nvCxnSpPr>
+        <p:spPr>
+          <a:xfrm>
+            <a:off x="6000414" y="16636"/>
+            <a:ext cx="0" cy="596956"/>
+          </a:xfrm>
+          <a:prstGeom prst="line">
+            <a:avLst/>
+          </a:prstGeom>
+          <a:ln w="28575">
+            <a:solidFill>
+              <a:srgbClr val="FF0000"/>
+            </a:solidFill>
+          </a:ln>
+        </p:spPr>
+        <p:style>
+          <a:lnRef idx="2">
+            <a:schemeClr val="accent1"/>
+          </a:lnRef>
+          <a:fillRef idx="0">
+            <a:schemeClr val="accent1"/>
+          </a:fillRef>
+          <a:effectRef idx="1">
+            <a:schemeClr val="accent1"/>
+          </a:effectRef>
+          <a:fontRef idx="minor">
+            <a:schemeClr val="tx1"/>
+          </a:fontRef>
+        </p:style>
+      </p:cxnSp>
+      <p:pic>
+        <p:nvPicPr>
+          <p:cNvPr id="5" name="图片 4">
+            <a:extLst>
+              <a:ext uri="{FF2B5EF4-FFF2-40B4-BE49-F238E27FC236}">
+                <a16:creationId xmlns:a16="http://schemas.microsoft.com/office/drawing/2014/main" id="{5ECB880E-69B6-34FD-78E5-04AC8BB616C0}"/>
+              </a:ext>
+            </a:extLst>
+          </p:cNvPr>
+          <p:cNvPicPr>
+            <a:picLocks noChangeAspect="1"/>
+          </p:cNvPicPr>
+          <p:nvPr/>
+        </p:nvPicPr>
+        <p:blipFill>
+          <a:blip r:embed="rId4"/>
+          <a:stretch>
+            <a:fillRect/>
+          </a:stretch>
+        </p:blipFill>
+        <p:spPr>
+          <a:xfrm>
+            <a:off x="2436038" y="-11816"/>
+            <a:ext cx="3384936" cy="735759"/>
+          </a:xfrm>
+          <a:prstGeom prst="rect">
+            <a:avLst/>
+          </a:prstGeom>
+        </p:spPr>
+      </p:pic>
+    </p:spTree>
+    <p:extLst>
+      <p:ext uri="{BB962C8B-B14F-4D97-AF65-F5344CB8AC3E}">
+        <p14:creationId xmlns:p14="http://schemas.microsoft.com/office/powerpoint/2010/main" val="1664574880"/>
+      </p:ext>
+    </p:extLst>
+  </p:cSld>
+  <p:clrMapOvr>
+    <a:masterClrMapping/>
+  </p:clrMapOvr>
+</p:sld>
+</file>
+
 <file path=ppt/theme/theme1.xml><?xml version="1.0" encoding="utf-8"?>
 <a:theme xmlns:a="http://schemas.openxmlformats.org/drawingml/2006/main" name="Office Theme">
   <a:themeElements>
-    <a:clrScheme name="Office">
+    <a:clrScheme name="Office 主题​​">
       <a:dk1>
         <a:sysClr val="windowText" lastClr="000000"/>
       </a:dk1>
@@ -3621,7 +3426,7 @@
         <a:srgbClr val="96607D"/>
       </a:folHlink>
     </a:clrScheme>
-    <a:fontScheme name="Office">
+    <a:fontScheme name="Office 主题​​">
       <a:majorFont>
         <a:latin typeface="Aptos Display" panose="02110004020202020204"/>
         <a:ea typeface=""/>
@@ -3727,7 +3532,7 @@
         <a:font script="Tfng" typeface="Ebrima"/>
       </a:minorFont>
     </a:fontScheme>
-    <a:fmtScheme name="Office">
+    <a:fmtScheme name="Office 主题​​">
       <a:fillStyleLst>
         <a:solidFill>
           <a:schemeClr val="phClr"/>

</xml_diff>